<commit_message>
commit slide bao cao cuoi cung
</commit_message>
<xml_diff>
--- a/Report/Baocao 3-12.pptx
+++ b/Report/Baocao 3-12.pptx
@@ -26,8 +26,7 @@
     <p:sldId id="281" r:id="rId20"/>
     <p:sldId id="277" r:id="rId21"/>
     <p:sldId id="283" r:id="rId22"/>
-    <p:sldId id="284" r:id="rId23"/>
-    <p:sldId id="282" r:id="rId24"/>
+    <p:sldId id="282" r:id="rId23"/>
   </p:sldIdLst>
   <p:sldSz cx="9144000" cy="6858000" type="screen4x3"/>
   <p:notesSz cx="6858000" cy="9144000"/>
@@ -267,7 +266,7 @@
             <a:fld id="{1D8BD707-D9CF-40AE-B4C6-C98DA3205C09}" type="datetimeFigureOut">
               <a:rPr lang="en-US" smtClean="0"/>
               <a:pPr/>
-              <a:t>12/3/2010</a:t>
+              <a:t>12/6/2010</a:t>
             </a:fld>
             <a:endParaRPr lang="en-US"/>
           </a:p>
@@ -1138,7 +1137,7 @@
             <a:fld id="{1D8BD707-D9CF-40AE-B4C6-C98DA3205C09}" type="datetimeFigureOut">
               <a:rPr lang="en-US" smtClean="0"/>
               <a:pPr/>
-              <a:t>12/3/2010</a:t>
+              <a:t>12/6/2010</a:t>
             </a:fld>
             <a:endParaRPr lang="en-US"/>
           </a:p>
@@ -1315,7 +1314,7 @@
             <a:fld id="{1D8BD707-D9CF-40AE-B4C6-C98DA3205C09}" type="datetimeFigureOut">
               <a:rPr lang="en-US" smtClean="0"/>
               <a:pPr/>
-              <a:t>12/3/2010</a:t>
+              <a:t>12/6/2010</a:t>
             </a:fld>
             <a:endParaRPr lang="en-US"/>
           </a:p>
@@ -1487,7 +1486,7 @@
             <a:fld id="{1D8BD707-D9CF-40AE-B4C6-C98DA3205C09}" type="datetimeFigureOut">
               <a:rPr lang="en-US" smtClean="0"/>
               <a:pPr/>
-              <a:t>12/3/2010</a:t>
+              <a:t>12/6/2010</a:t>
             </a:fld>
             <a:endParaRPr lang="en-US"/>
           </a:p>
@@ -1699,7 +1698,7 @@
             <a:fld id="{1D8BD707-D9CF-40AE-B4C6-C98DA3205C09}" type="datetimeFigureOut">
               <a:rPr lang="en-US" smtClean="0"/>
               <a:pPr/>
-              <a:t>12/3/2010</a:t>
+              <a:t>12/6/2010</a:t>
             </a:fld>
             <a:endParaRPr lang="en-US"/>
           </a:p>
@@ -2515,7 +2514,7 @@
             <a:fld id="{1D8BD707-D9CF-40AE-B4C6-C98DA3205C09}" type="datetimeFigureOut">
               <a:rPr lang="en-US" smtClean="0"/>
               <a:pPr/>
-              <a:t>12/3/2010</a:t>
+              <a:t>12/6/2010</a:t>
             </a:fld>
             <a:endParaRPr lang="en-US"/>
           </a:p>
@@ -2753,7 +2752,7 @@
             <a:fld id="{1D8BD707-D9CF-40AE-B4C6-C98DA3205C09}" type="datetimeFigureOut">
               <a:rPr lang="en-US" smtClean="0"/>
               <a:pPr/>
-              <a:t>12/3/2010</a:t>
+              <a:t>12/6/2010</a:t>
             </a:fld>
             <a:endParaRPr lang="en-US"/>
           </a:p>
@@ -3078,7 +3077,7 @@
             <a:fld id="{1D8BD707-D9CF-40AE-B4C6-C98DA3205C09}" type="datetimeFigureOut">
               <a:rPr lang="en-US" smtClean="0"/>
               <a:pPr/>
-              <a:t>12/3/2010</a:t>
+              <a:t>12/6/2010</a:t>
             </a:fld>
             <a:endParaRPr lang="en-US"/>
           </a:p>
@@ -3170,7 +3169,7 @@
             <a:fld id="{1D8BD707-D9CF-40AE-B4C6-C98DA3205C09}" type="datetimeFigureOut">
               <a:rPr lang="en-US" smtClean="0"/>
               <a:pPr/>
-              <a:t>12/3/2010</a:t>
+              <a:t>12/6/2010</a:t>
             </a:fld>
             <a:endParaRPr lang="en-US"/>
           </a:p>
@@ -3689,7 +3688,7 @@
             <a:fld id="{1D8BD707-D9CF-40AE-B4C6-C98DA3205C09}" type="datetimeFigureOut">
               <a:rPr lang="en-US" smtClean="0"/>
               <a:pPr/>
-              <a:t>12/3/2010</a:t>
+              <a:t>12/6/2010</a:t>
             </a:fld>
             <a:endParaRPr lang="en-US"/>
           </a:p>
@@ -4202,7 +4201,7 @@
             <a:fld id="{1D8BD707-D9CF-40AE-B4C6-C98DA3205C09}" type="datetimeFigureOut">
               <a:rPr lang="en-US" smtClean="0"/>
               <a:pPr/>
-              <a:t>12/3/2010</a:t>
+              <a:t>12/6/2010</a:t>
             </a:fld>
             <a:endParaRPr lang="en-US"/>
           </a:p>
@@ -4449,7 +4448,7 @@
             <a:fld id="{1D8BD707-D9CF-40AE-B4C6-C98DA3205C09}" type="datetimeFigureOut">
               <a:rPr lang="en-US" smtClean="0"/>
               <a:pPr/>
-              <a:t>12/3/2010</a:t>
+              <a:t>12/6/2010</a:t>
             </a:fld>
             <a:endParaRPr lang="en-US"/>
           </a:p>
@@ -6945,14 +6944,7 @@
                 <a:latin typeface="Times New Roman" pitchFamily="18" charset="0"/>
                 <a:cs typeface="Times New Roman" pitchFamily="18" charset="0"/>
               </a:rPr>
-              <a:t> CCS </a:t>
-            </a:r>
-            <a:r>
-              <a:rPr lang="en-US" sz="2000" dirty="0" smtClean="0">
-                <a:latin typeface="Times New Roman" pitchFamily="18" charset="0"/>
-                <a:cs typeface="Times New Roman" pitchFamily="18" charset="0"/>
-              </a:rPr>
-              <a:t>, </a:t>
+              <a:t> CCS , </a:t>
             </a:r>
             <a:r>
               <a:rPr lang="en-US" sz="2000" dirty="0" err="1" smtClean="0">
@@ -16176,7 +16168,7 @@
           <a:p>
             <a:r>
               <a:rPr lang="en-US" sz="2800" dirty="0" err="1" smtClean="0"/>
-              <a:t>Kế</a:t>
+              <a:t>Một</a:t>
             </a:r>
             <a:r>
               <a:rPr lang="en-US" sz="2800" dirty="0" smtClean="0"/>
@@ -16184,7 +16176,7 @@
             </a:r>
             <a:r>
               <a:rPr lang="en-US" sz="2800" dirty="0" err="1" smtClean="0"/>
-              <a:t>hoạch</a:t>
+              <a:t>số</a:t>
             </a:r>
             <a:r>
               <a:rPr lang="en-US" sz="2800" dirty="0" smtClean="0"/>
@@ -16192,15 +16184,7 @@
             </a:r>
             <a:r>
               <a:rPr lang="en-US" sz="2800" dirty="0" err="1" smtClean="0"/>
-              <a:t>triển</a:t>
-            </a:r>
-            <a:r>
-              <a:rPr lang="en-US" sz="2800" dirty="0" smtClean="0"/>
-              <a:t> </a:t>
-            </a:r>
-            <a:r>
-              <a:rPr lang="en-US" sz="2800" dirty="0" err="1" smtClean="0"/>
-              <a:t>khai</a:t>
+              <a:t>hướng</a:t>
             </a:r>
             <a:r>
               <a:rPr lang="en-US" sz="2800" dirty="0" smtClean="0"/>
@@ -16232,7 +16216,15 @@
             </a:r>
             <a:r>
               <a:rPr lang="en-US" sz="2800" dirty="0" err="1" smtClean="0"/>
-              <a:t>tới</a:t>
+              <a:t>tiếp</a:t>
+            </a:r>
+            <a:r>
+              <a:rPr lang="en-US" sz="2800" dirty="0" smtClean="0"/>
+              <a:t> </a:t>
+            </a:r>
+            <a:r>
+              <a:rPr lang="en-US" sz="2800" dirty="0" err="1" smtClean="0"/>
+              <a:t>theo</a:t>
             </a:r>
             <a:endParaRPr lang="en-US" sz="2400" dirty="0"/>
           </a:p>
@@ -16250,340 +16242,1790 @@
         </p:nvSpPr>
         <p:spPr>
           <a:xfrm>
-            <a:off x="533400" y="1066800"/>
-            <a:ext cx="8077200" cy="5407152"/>
+            <a:off x="533400" y="990600"/>
+            <a:ext cx="8153400" cy="5562600"/>
           </a:xfrm>
         </p:spPr>
         <p:txBody>
-          <a:bodyPr/>
+          <a:bodyPr>
+            <a:normAutofit/>
+          </a:bodyPr>
           <a:lstStyle/>
-          <a:p>
-            <a:endParaRPr lang="en-US" dirty="0" smtClean="0"/>
-          </a:p>
           <a:p>
             <a:pPr>
               <a:buNone/>
             </a:pPr>
-            <a:endParaRPr lang="en-US" dirty="0" smtClean="0"/>
-          </a:p>
-          <a:p>
-            <a:r>
-              <a:rPr lang="en-US" dirty="0" err="1" smtClean="0"/>
-              <a:t>Nhóm</a:t>
-            </a:r>
-            <a:r>
-              <a:rPr lang="en-US" dirty="0" smtClean="0"/>
-              <a:t> </a:t>
-            </a:r>
-            <a:r>
-              <a:rPr lang="en-US" dirty="0" err="1" smtClean="0"/>
-              <a:t>dự</a:t>
-            </a:r>
-            <a:r>
-              <a:rPr lang="en-US" dirty="0" smtClean="0"/>
-              <a:t> </a:t>
-            </a:r>
-            <a:r>
-              <a:rPr lang="en-US" dirty="0" err="1" smtClean="0"/>
-              <a:t>định</a:t>
-            </a:r>
-            <a:r>
-              <a:rPr lang="en-US" dirty="0" smtClean="0"/>
-              <a:t> </a:t>
-            </a:r>
-            <a:r>
-              <a:rPr lang="en-US" dirty="0" err="1" smtClean="0"/>
-              <a:t>thực</a:t>
-            </a:r>
-            <a:r>
-              <a:rPr lang="en-US" dirty="0" smtClean="0"/>
-              <a:t> </a:t>
-            </a:r>
-            <a:r>
-              <a:rPr lang="en-US" dirty="0" err="1" smtClean="0"/>
+            <a:endParaRPr lang="en-US" sz="2000" dirty="0" smtClean="0">
+              <a:latin typeface="Times New Roman" pitchFamily="18" charset="0"/>
+              <a:cs typeface="Times New Roman" pitchFamily="18" charset="0"/>
+            </a:endParaRPr>
+          </a:p>
+          <a:p>
+            <a:r>
+              <a:rPr lang="en-US" sz="2000" dirty="0" err="1" smtClean="0">
+                <a:latin typeface="Times New Roman" pitchFamily="18" charset="0"/>
+                <a:cs typeface="Times New Roman" pitchFamily="18" charset="0"/>
+              </a:rPr>
+              <a:t>Thực</a:t>
+            </a:r>
+            <a:r>
+              <a:rPr lang="en-US" sz="2000" dirty="0" smtClean="0">
+                <a:latin typeface="Times New Roman" pitchFamily="18" charset="0"/>
+                <a:cs typeface="Times New Roman" pitchFamily="18" charset="0"/>
+              </a:rPr>
+              <a:t> </a:t>
+            </a:r>
+            <a:r>
+              <a:rPr lang="en-US" sz="2000" dirty="0" err="1" smtClean="0">
+                <a:latin typeface="Times New Roman" pitchFamily="18" charset="0"/>
+                <a:cs typeface="Times New Roman" pitchFamily="18" charset="0"/>
+              </a:rPr>
               <a:t>hiện</a:t>
             </a:r>
             <a:r>
-              <a:rPr lang="en-US" dirty="0" smtClean="0"/>
-              <a:t> </a:t>
-            </a:r>
-            <a:r>
-              <a:rPr lang="en-US" dirty="0" err="1" smtClean="0"/>
+              <a:rPr lang="en-US" sz="2000" dirty="0" smtClean="0">
+                <a:latin typeface="Times New Roman" pitchFamily="18" charset="0"/>
+                <a:cs typeface="Times New Roman" pitchFamily="18" charset="0"/>
+              </a:rPr>
+              <a:t> </a:t>
+            </a:r>
+            <a:r>
+              <a:rPr lang="en-US" sz="2000" dirty="0" err="1" smtClean="0">
+                <a:latin typeface="Times New Roman" pitchFamily="18" charset="0"/>
+                <a:cs typeface="Times New Roman" pitchFamily="18" charset="0"/>
+              </a:rPr>
               <a:t>phân</a:t>
             </a:r>
             <a:r>
-              <a:rPr lang="en-US" dirty="0" smtClean="0"/>
-              <a:t> </a:t>
-            </a:r>
-            <a:r>
-              <a:rPr lang="en-US" dirty="0" err="1" smtClean="0"/>
+              <a:rPr lang="en-US" sz="2000" dirty="0" smtClean="0">
+                <a:latin typeface="Times New Roman" pitchFamily="18" charset="0"/>
+                <a:cs typeface="Times New Roman" pitchFamily="18" charset="0"/>
+              </a:rPr>
+              <a:t> </a:t>
+            </a:r>
+            <a:r>
+              <a:rPr lang="en-US" sz="2000" dirty="0" err="1" smtClean="0">
+                <a:latin typeface="Times New Roman" pitchFamily="18" charset="0"/>
+                <a:cs typeface="Times New Roman" pitchFamily="18" charset="0"/>
+              </a:rPr>
               <a:t>loại</a:t>
             </a:r>
             <a:r>
-              <a:rPr lang="en-US" dirty="0" smtClean="0"/>
-              <a:t> </a:t>
-            </a:r>
-            <a:r>
-              <a:rPr lang="en-US" dirty="0" err="1" smtClean="0"/>
+              <a:rPr lang="en-US" sz="2000" dirty="0" smtClean="0">
+                <a:latin typeface="Times New Roman" pitchFamily="18" charset="0"/>
+                <a:cs typeface="Times New Roman" pitchFamily="18" charset="0"/>
+              </a:rPr>
+              <a:t> </a:t>
+            </a:r>
+            <a:r>
+              <a:rPr lang="en-US" sz="2000" dirty="0" err="1" smtClean="0">
+                <a:latin typeface="Times New Roman" pitchFamily="18" charset="0"/>
+                <a:cs typeface="Times New Roman" pitchFamily="18" charset="0"/>
+              </a:rPr>
               <a:t>chủ</a:t>
             </a:r>
             <a:r>
-              <a:rPr lang="en-US" dirty="0" smtClean="0"/>
-              <a:t> </a:t>
-            </a:r>
-            <a:r>
-              <a:rPr lang="en-US" dirty="0" err="1" smtClean="0"/>
+              <a:rPr lang="en-US" sz="2000" dirty="0" smtClean="0">
+                <a:latin typeface="Times New Roman" pitchFamily="18" charset="0"/>
+                <a:cs typeface="Times New Roman" pitchFamily="18" charset="0"/>
+              </a:rPr>
+              <a:t> </a:t>
+            </a:r>
+            <a:r>
+              <a:rPr lang="en-US" sz="2000" dirty="0" err="1" smtClean="0">
+                <a:latin typeface="Times New Roman" pitchFamily="18" charset="0"/>
+                <a:cs typeface="Times New Roman" pitchFamily="18" charset="0"/>
+              </a:rPr>
               <a:t>đề</a:t>
             </a:r>
             <a:r>
-              <a:rPr lang="en-US" dirty="0" smtClean="0"/>
-              <a:t> </a:t>
-            </a:r>
-            <a:r>
-              <a:rPr lang="en-US" dirty="0" err="1" smtClean="0"/>
+              <a:rPr lang="en-US" sz="2000" dirty="0" smtClean="0">
+                <a:latin typeface="Times New Roman" pitchFamily="18" charset="0"/>
+                <a:cs typeface="Times New Roman" pitchFamily="18" charset="0"/>
+              </a:rPr>
+              <a:t> </a:t>
+            </a:r>
+            <a:r>
+              <a:rPr lang="en-US" sz="2000" dirty="0" err="1" smtClean="0">
+                <a:latin typeface="Times New Roman" pitchFamily="18" charset="0"/>
+                <a:cs typeface="Times New Roman" pitchFamily="18" charset="0"/>
+              </a:rPr>
               <a:t>cho</a:t>
             </a:r>
             <a:r>
-              <a:rPr lang="en-US" dirty="0" smtClean="0"/>
-              <a:t> </a:t>
-            </a:r>
-            <a:r>
-              <a:rPr lang="en-US" dirty="0" err="1" smtClean="0"/>
+              <a:rPr lang="en-US" sz="2000" dirty="0" smtClean="0">
+                <a:latin typeface="Times New Roman" pitchFamily="18" charset="0"/>
+                <a:cs typeface="Times New Roman" pitchFamily="18" charset="0"/>
+              </a:rPr>
+              <a:t> </a:t>
+            </a:r>
+            <a:r>
+              <a:rPr lang="en-US" sz="2000" dirty="0" err="1" smtClean="0">
+                <a:latin typeface="Times New Roman" pitchFamily="18" charset="0"/>
+                <a:cs typeface="Times New Roman" pitchFamily="18" charset="0"/>
+              </a:rPr>
               <a:t>các</a:t>
             </a:r>
             <a:r>
-              <a:rPr lang="en-US" dirty="0" smtClean="0"/>
-              <a:t> </a:t>
-            </a:r>
-            <a:r>
-              <a:rPr lang="en-US" dirty="0" err="1" smtClean="0"/>
+              <a:rPr lang="en-US" sz="2000" dirty="0" smtClean="0">
+                <a:latin typeface="Times New Roman" pitchFamily="18" charset="0"/>
+                <a:cs typeface="Times New Roman" pitchFamily="18" charset="0"/>
+              </a:rPr>
+              <a:t> </a:t>
+            </a:r>
+            <a:r>
+              <a:rPr lang="en-US" sz="2000" dirty="0" err="1" smtClean="0">
+                <a:latin typeface="Times New Roman" pitchFamily="18" charset="0"/>
+                <a:cs typeface="Times New Roman" pitchFamily="18" charset="0"/>
+              </a:rPr>
               <a:t>bài</a:t>
             </a:r>
             <a:r>
-              <a:rPr lang="en-US" dirty="0" smtClean="0"/>
-              <a:t> </a:t>
-            </a:r>
-            <a:r>
-              <a:rPr lang="en-US" dirty="0" err="1" smtClean="0"/>
+              <a:rPr lang="en-US" sz="2000" dirty="0" smtClean="0">
+                <a:latin typeface="Times New Roman" pitchFamily="18" charset="0"/>
+                <a:cs typeface="Times New Roman" pitchFamily="18" charset="0"/>
+              </a:rPr>
+              <a:t> </a:t>
+            </a:r>
+            <a:r>
+              <a:rPr lang="en-US" sz="2000" dirty="0" err="1" smtClean="0">
+                <a:latin typeface="Times New Roman" pitchFamily="18" charset="0"/>
+                <a:cs typeface="Times New Roman" pitchFamily="18" charset="0"/>
+              </a:rPr>
               <a:t>báo</a:t>
             </a:r>
             <a:r>
-              <a:rPr lang="en-US" dirty="0" smtClean="0"/>
-              <a:t> </a:t>
-            </a:r>
-            <a:r>
-              <a:rPr lang="en-US" dirty="0" err="1" smtClean="0"/>
+              <a:rPr lang="en-US" sz="2000" dirty="0" smtClean="0">
+                <a:latin typeface="Times New Roman" pitchFamily="18" charset="0"/>
+                <a:cs typeface="Times New Roman" pitchFamily="18" charset="0"/>
+              </a:rPr>
+              <a:t> </a:t>
+            </a:r>
+            <a:r>
+              <a:rPr lang="en-US" sz="2000" dirty="0" err="1" smtClean="0">
+                <a:latin typeface="Times New Roman" pitchFamily="18" charset="0"/>
+                <a:cs typeface="Times New Roman" pitchFamily="18" charset="0"/>
+              </a:rPr>
               <a:t>thu</a:t>
             </a:r>
             <a:r>
-              <a:rPr lang="en-US" dirty="0" smtClean="0"/>
-              <a:t> </a:t>
-            </a:r>
-            <a:r>
-              <a:rPr lang="en-US" dirty="0" err="1" smtClean="0"/>
+              <a:rPr lang="en-US" sz="2000" dirty="0" smtClean="0">
+                <a:latin typeface="Times New Roman" pitchFamily="18" charset="0"/>
+                <a:cs typeface="Times New Roman" pitchFamily="18" charset="0"/>
+              </a:rPr>
+              <a:t> </a:t>
+            </a:r>
+            <a:r>
+              <a:rPr lang="en-US" sz="2000" dirty="0" err="1" smtClean="0">
+                <a:latin typeface="Times New Roman" pitchFamily="18" charset="0"/>
+                <a:cs typeface="Times New Roman" pitchFamily="18" charset="0"/>
+              </a:rPr>
               <a:t>thập</a:t>
             </a:r>
             <a:r>
-              <a:rPr lang="en-US" dirty="0" smtClean="0"/>
-              <a:t> </a:t>
-            </a:r>
-            <a:r>
-              <a:rPr lang="en-US" dirty="0" err="1" smtClean="0"/>
+              <a:rPr lang="en-US" sz="2000" dirty="0" smtClean="0">
+                <a:latin typeface="Times New Roman" pitchFamily="18" charset="0"/>
+                <a:cs typeface="Times New Roman" pitchFamily="18" charset="0"/>
+              </a:rPr>
+              <a:t> </a:t>
+            </a:r>
+            <a:r>
+              <a:rPr lang="en-US" sz="2000" dirty="0" err="1" smtClean="0">
+                <a:latin typeface="Times New Roman" pitchFamily="18" charset="0"/>
+                <a:cs typeface="Times New Roman" pitchFamily="18" charset="0"/>
+              </a:rPr>
               <a:t>được</a:t>
             </a:r>
             <a:r>
-              <a:rPr lang="en-US" dirty="0" smtClean="0"/>
+              <a:rPr lang="en-US" sz="2000" dirty="0" smtClean="0">
+                <a:latin typeface="Times New Roman" pitchFamily="18" charset="0"/>
+                <a:cs typeface="Times New Roman" pitchFamily="18" charset="0"/>
+              </a:rPr>
               <a:t>, </a:t>
             </a:r>
             <a:r>
-              <a:rPr lang="en-US" dirty="0" err="1" smtClean="0"/>
+              <a:rPr lang="en-US" sz="2000" dirty="0" err="1" smtClean="0">
+                <a:latin typeface="Times New Roman" pitchFamily="18" charset="0"/>
+                <a:cs typeface="Times New Roman" pitchFamily="18" charset="0"/>
+              </a:rPr>
               <a:t>dựa</a:t>
             </a:r>
             <a:r>
-              <a:rPr lang="en-US" dirty="0" smtClean="0"/>
-              <a:t> </a:t>
-            </a:r>
-            <a:r>
-              <a:rPr lang="en-US" dirty="0" err="1" smtClean="0"/>
+              <a:rPr lang="en-US" sz="2000" dirty="0" smtClean="0">
+                <a:latin typeface="Times New Roman" pitchFamily="18" charset="0"/>
+                <a:cs typeface="Times New Roman" pitchFamily="18" charset="0"/>
+              </a:rPr>
+              <a:t> </a:t>
+            </a:r>
+            <a:r>
+              <a:rPr lang="en-US" sz="2000" dirty="0" err="1" smtClean="0">
+                <a:latin typeface="Times New Roman" pitchFamily="18" charset="0"/>
+                <a:cs typeface="Times New Roman" pitchFamily="18" charset="0"/>
+              </a:rPr>
               <a:t>vào</a:t>
             </a:r>
             <a:r>
-              <a:rPr lang="en-US" dirty="0" smtClean="0"/>
+              <a:rPr lang="en-US" sz="2000" dirty="0" smtClean="0">
+                <a:latin typeface="Times New Roman" pitchFamily="18" charset="0"/>
+                <a:cs typeface="Times New Roman" pitchFamily="18" charset="0"/>
+              </a:rPr>
               <a:t> Title - abstract </a:t>
             </a:r>
             <a:r>
-              <a:rPr lang="en-US" dirty="0" err="1" smtClean="0"/>
+              <a:rPr lang="en-US" sz="2000" dirty="0" err="1" smtClean="0">
+                <a:latin typeface="Times New Roman" pitchFamily="18" charset="0"/>
+                <a:cs typeface="Times New Roman" pitchFamily="18" charset="0"/>
+              </a:rPr>
               <a:t>của</a:t>
             </a:r>
             <a:r>
-              <a:rPr lang="en-US" dirty="0" smtClean="0"/>
-              <a:t> </a:t>
-            </a:r>
-            <a:r>
-              <a:rPr lang="en-US" dirty="0" err="1" smtClean="0"/>
+              <a:rPr lang="en-US" sz="2000" dirty="0" smtClean="0">
+                <a:latin typeface="Times New Roman" pitchFamily="18" charset="0"/>
+                <a:cs typeface="Times New Roman" pitchFamily="18" charset="0"/>
+              </a:rPr>
+              <a:t> </a:t>
+            </a:r>
+            <a:r>
+              <a:rPr lang="en-US" sz="2000" dirty="0" err="1" smtClean="0">
+                <a:latin typeface="Times New Roman" pitchFamily="18" charset="0"/>
+                <a:cs typeface="Times New Roman" pitchFamily="18" charset="0"/>
+              </a:rPr>
               <a:t>bài</a:t>
             </a:r>
             <a:r>
-              <a:rPr lang="en-US" dirty="0" smtClean="0"/>
-              <a:t> </a:t>
-            </a:r>
-            <a:r>
-              <a:rPr lang="en-US" dirty="0" err="1" smtClean="0"/>
+              <a:rPr lang="en-US" sz="2000" dirty="0" smtClean="0">
+                <a:latin typeface="Times New Roman" pitchFamily="18" charset="0"/>
+                <a:cs typeface="Times New Roman" pitchFamily="18" charset="0"/>
+              </a:rPr>
+              <a:t> </a:t>
+            </a:r>
+            <a:r>
+              <a:rPr lang="en-US" sz="2000" dirty="0" err="1" smtClean="0">
+                <a:latin typeface="Times New Roman" pitchFamily="18" charset="0"/>
+                <a:cs typeface="Times New Roman" pitchFamily="18" charset="0"/>
+              </a:rPr>
+              <a:t>báo.Phạm</a:t>
+            </a:r>
+            <a:r>
+              <a:rPr lang="en-US" sz="2000" dirty="0" smtClean="0">
+                <a:latin typeface="Times New Roman" pitchFamily="18" charset="0"/>
+                <a:cs typeface="Times New Roman" pitchFamily="18" charset="0"/>
+              </a:rPr>
+              <a:t> vi </a:t>
+            </a:r>
+            <a:r>
+              <a:rPr lang="en-US" sz="2000" dirty="0" err="1" smtClean="0">
+                <a:latin typeface="Times New Roman" pitchFamily="18" charset="0"/>
+                <a:cs typeface="Times New Roman" pitchFamily="18" charset="0"/>
+              </a:rPr>
+              <a:t>phân</a:t>
+            </a:r>
+            <a:r>
+              <a:rPr lang="en-US" sz="2000" dirty="0" smtClean="0">
+                <a:latin typeface="Times New Roman" pitchFamily="18" charset="0"/>
+                <a:cs typeface="Times New Roman" pitchFamily="18" charset="0"/>
+              </a:rPr>
+              <a:t> </a:t>
+            </a:r>
+            <a:r>
+              <a:rPr lang="en-US" sz="2000" dirty="0" err="1" smtClean="0">
+                <a:latin typeface="Times New Roman" pitchFamily="18" charset="0"/>
+                <a:cs typeface="Times New Roman" pitchFamily="18" charset="0"/>
+              </a:rPr>
+              <a:t>loại</a:t>
+            </a:r>
+            <a:r>
+              <a:rPr lang="en-US" sz="2000" dirty="0" smtClean="0">
+                <a:latin typeface="Times New Roman" pitchFamily="18" charset="0"/>
+                <a:cs typeface="Times New Roman" pitchFamily="18" charset="0"/>
+              </a:rPr>
+              <a:t> </a:t>
+            </a:r>
+            <a:r>
+              <a:rPr lang="en-US" sz="2000" dirty="0" err="1" smtClean="0">
+                <a:latin typeface="Times New Roman" pitchFamily="18" charset="0"/>
+                <a:cs typeface="Times New Roman" pitchFamily="18" charset="0"/>
+              </a:rPr>
+              <a:t>chủ</a:t>
+            </a:r>
+            <a:r>
+              <a:rPr lang="en-US" sz="2000" dirty="0" smtClean="0">
+                <a:latin typeface="Times New Roman" pitchFamily="18" charset="0"/>
+                <a:cs typeface="Times New Roman" pitchFamily="18" charset="0"/>
+              </a:rPr>
+              <a:t> </a:t>
+            </a:r>
+            <a:r>
+              <a:rPr lang="en-US" sz="2000" dirty="0" err="1" smtClean="0">
+                <a:latin typeface="Times New Roman" pitchFamily="18" charset="0"/>
+                <a:cs typeface="Times New Roman" pitchFamily="18" charset="0"/>
+              </a:rPr>
+              <a:t>đề</a:t>
+            </a:r>
+            <a:r>
+              <a:rPr lang="en-US" sz="2000" dirty="0" smtClean="0">
+                <a:latin typeface="Times New Roman" pitchFamily="18" charset="0"/>
+                <a:cs typeface="Times New Roman" pitchFamily="18" charset="0"/>
+              </a:rPr>
+              <a:t> </a:t>
+            </a:r>
+            <a:r>
+              <a:rPr lang="en-US" sz="2000" dirty="0" err="1" smtClean="0">
+                <a:latin typeface="Times New Roman" pitchFamily="18" charset="0"/>
+                <a:cs typeface="Times New Roman" pitchFamily="18" charset="0"/>
+              </a:rPr>
+              <a:t>thuộc</a:t>
+            </a:r>
+            <a:r>
+              <a:rPr lang="en-US" sz="2000" dirty="0" smtClean="0">
+                <a:latin typeface="Times New Roman" pitchFamily="18" charset="0"/>
+                <a:cs typeface="Times New Roman" pitchFamily="18" charset="0"/>
+              </a:rPr>
+              <a:t> </a:t>
+            </a:r>
+            <a:r>
+              <a:rPr lang="en-US" sz="2000" dirty="0" err="1" smtClean="0">
+                <a:latin typeface="Times New Roman" pitchFamily="18" charset="0"/>
+                <a:cs typeface="Times New Roman" pitchFamily="18" charset="0"/>
+              </a:rPr>
+              <a:t>khoa</a:t>
+            </a:r>
+            <a:r>
+              <a:rPr lang="en-US" sz="2000" dirty="0" smtClean="0">
+                <a:latin typeface="Times New Roman" pitchFamily="18" charset="0"/>
+                <a:cs typeface="Times New Roman" pitchFamily="18" charset="0"/>
+              </a:rPr>
+              <a:t> </a:t>
+            </a:r>
+            <a:r>
+              <a:rPr lang="en-US" sz="2000" dirty="0" err="1" smtClean="0">
+                <a:latin typeface="Times New Roman" pitchFamily="18" charset="0"/>
+                <a:cs typeface="Times New Roman" pitchFamily="18" charset="0"/>
+              </a:rPr>
+              <a:t>học</a:t>
+            </a:r>
+            <a:r>
+              <a:rPr lang="en-US" sz="2000" dirty="0" smtClean="0">
+                <a:latin typeface="Times New Roman" pitchFamily="18" charset="0"/>
+                <a:cs typeface="Times New Roman" pitchFamily="18" charset="0"/>
+              </a:rPr>
+              <a:t> </a:t>
+            </a:r>
+            <a:r>
+              <a:rPr lang="en-US" sz="2000" dirty="0" err="1" smtClean="0">
+                <a:latin typeface="Times New Roman" pitchFamily="18" charset="0"/>
+                <a:cs typeface="Times New Roman" pitchFamily="18" charset="0"/>
+              </a:rPr>
+              <a:t>máy</a:t>
+            </a:r>
+            <a:r>
+              <a:rPr lang="en-US" sz="2000" dirty="0" smtClean="0">
+                <a:latin typeface="Times New Roman" pitchFamily="18" charset="0"/>
+                <a:cs typeface="Times New Roman" pitchFamily="18" charset="0"/>
+              </a:rPr>
+              <a:t> </a:t>
+            </a:r>
+            <a:r>
+              <a:rPr lang="en-US" sz="2000" dirty="0" err="1" smtClean="0">
+                <a:latin typeface="Times New Roman" pitchFamily="18" charset="0"/>
+                <a:cs typeface="Times New Roman" pitchFamily="18" charset="0"/>
+              </a:rPr>
+              <a:t>tính</a:t>
+            </a:r>
+            <a:r>
+              <a:rPr lang="en-US" sz="2000" dirty="0" smtClean="0">
+                <a:latin typeface="Times New Roman" pitchFamily="18" charset="0"/>
+                <a:cs typeface="Times New Roman" pitchFamily="18" charset="0"/>
+              </a:rPr>
+              <a:t> (</a:t>
+            </a:r>
+            <a:r>
+              <a:rPr lang="en-US" sz="2000" i="1" dirty="0" err="1" smtClean="0">
+                <a:latin typeface="Times New Roman" pitchFamily="18" charset="0"/>
+                <a:cs typeface="Times New Roman" pitchFamily="18" charset="0"/>
+              </a:rPr>
+              <a:t>tên</a:t>
+            </a:r>
+            <a:r>
+              <a:rPr lang="en-US" sz="2000" i="1" dirty="0" smtClean="0">
+                <a:latin typeface="Times New Roman" pitchFamily="18" charset="0"/>
+                <a:cs typeface="Times New Roman" pitchFamily="18" charset="0"/>
+              </a:rPr>
+              <a:t> </a:t>
+            </a:r>
+            <a:r>
+              <a:rPr lang="en-US" sz="2000" i="1" dirty="0" err="1" smtClean="0">
+                <a:latin typeface="Times New Roman" pitchFamily="18" charset="0"/>
+                <a:cs typeface="Times New Roman" pitchFamily="18" charset="0"/>
+              </a:rPr>
+              <a:t>chủ</a:t>
+            </a:r>
+            <a:r>
+              <a:rPr lang="en-US" sz="2000" i="1" dirty="0" smtClean="0">
+                <a:latin typeface="Times New Roman" pitchFamily="18" charset="0"/>
+                <a:cs typeface="Times New Roman" pitchFamily="18" charset="0"/>
+              </a:rPr>
+              <a:t> </a:t>
+            </a:r>
+            <a:r>
+              <a:rPr lang="en-US" sz="2000" i="1" dirty="0" err="1" smtClean="0">
+                <a:latin typeface="Times New Roman" pitchFamily="18" charset="0"/>
+                <a:cs typeface="Times New Roman" pitchFamily="18" charset="0"/>
+              </a:rPr>
+              <a:t>đề</a:t>
+            </a:r>
+            <a:r>
+              <a:rPr lang="en-US" sz="2000" i="1" dirty="0" smtClean="0">
+                <a:latin typeface="Times New Roman" pitchFamily="18" charset="0"/>
+                <a:cs typeface="Times New Roman" pitchFamily="18" charset="0"/>
+              </a:rPr>
+              <a:t> </a:t>
+            </a:r>
+            <a:r>
+              <a:rPr lang="en-US" sz="2000" i="1" dirty="0" err="1" smtClean="0">
+                <a:latin typeface="Times New Roman" pitchFamily="18" charset="0"/>
+                <a:cs typeface="Times New Roman" pitchFamily="18" charset="0"/>
+              </a:rPr>
+              <a:t>được</a:t>
+            </a:r>
+            <a:r>
+              <a:rPr lang="en-US" sz="2000" i="1" dirty="0" smtClean="0">
+                <a:latin typeface="Times New Roman" pitchFamily="18" charset="0"/>
+                <a:cs typeface="Times New Roman" pitchFamily="18" charset="0"/>
+              </a:rPr>
+              <a:t> </a:t>
+            </a:r>
+            <a:r>
+              <a:rPr lang="en-US" sz="2000" i="1" dirty="0" err="1" smtClean="0">
+                <a:latin typeface="Times New Roman" pitchFamily="18" charset="0"/>
+                <a:cs typeface="Times New Roman" pitchFamily="18" charset="0"/>
+              </a:rPr>
+              <a:t>tham</a:t>
+            </a:r>
+            <a:r>
+              <a:rPr lang="en-US" sz="2000" i="1" dirty="0" smtClean="0">
+                <a:latin typeface="Times New Roman" pitchFamily="18" charset="0"/>
+                <a:cs typeface="Times New Roman" pitchFamily="18" charset="0"/>
+              </a:rPr>
+              <a:t> </a:t>
+            </a:r>
+            <a:r>
+              <a:rPr lang="en-US" sz="2000" i="1" dirty="0" err="1" smtClean="0">
+                <a:latin typeface="Times New Roman" pitchFamily="18" charset="0"/>
+                <a:cs typeface="Times New Roman" pitchFamily="18" charset="0"/>
+              </a:rPr>
+              <a:t>khảo</a:t>
+            </a:r>
+            <a:r>
+              <a:rPr lang="en-US" sz="2000" i="1" dirty="0" smtClean="0">
+                <a:latin typeface="Times New Roman" pitchFamily="18" charset="0"/>
+                <a:cs typeface="Times New Roman" pitchFamily="18" charset="0"/>
+              </a:rPr>
+              <a:t> </a:t>
+            </a:r>
+            <a:r>
+              <a:rPr lang="en-US" sz="2000" i="1" dirty="0" err="1" smtClean="0">
+                <a:latin typeface="Times New Roman" pitchFamily="18" charset="0"/>
+                <a:cs typeface="Times New Roman" pitchFamily="18" charset="0"/>
+              </a:rPr>
+              <a:t>từ</a:t>
+            </a:r>
+            <a:r>
+              <a:rPr lang="en-US" sz="2000" i="1" dirty="0" smtClean="0">
+                <a:latin typeface="Times New Roman" pitchFamily="18" charset="0"/>
+                <a:cs typeface="Times New Roman" pitchFamily="18" charset="0"/>
+              </a:rPr>
+              <a:t> wiki</a:t>
+            </a:r>
+            <a:r>
+              <a:rPr lang="en-US" sz="2000" dirty="0" smtClean="0">
+                <a:latin typeface="Times New Roman" pitchFamily="18" charset="0"/>
+                <a:cs typeface="Times New Roman" pitchFamily="18" charset="0"/>
+              </a:rPr>
+              <a:t>)</a:t>
+            </a:r>
+            <a:r>
+              <a:rPr lang="en-US" sz="2000" dirty="0" smtClean="0">
+                <a:latin typeface="Times New Roman" pitchFamily="18" charset="0"/>
+                <a:cs typeface="Times New Roman" pitchFamily="18" charset="0"/>
+                <a:sym typeface="Wingdings" pitchFamily="2" charset="2"/>
+              </a:rPr>
+              <a:t>.</a:t>
+            </a:r>
+          </a:p>
+          <a:p>
+            <a:endParaRPr lang="en-US" sz="2000" dirty="0" smtClean="0">
+              <a:latin typeface="Times New Roman" pitchFamily="18" charset="0"/>
+              <a:cs typeface="Times New Roman" pitchFamily="18" charset="0"/>
+              <a:sym typeface="Wingdings" pitchFamily="2" charset="2"/>
+            </a:endParaRPr>
+          </a:p>
+          <a:p>
+            <a:r>
+              <a:rPr lang="en-US" sz="2000" dirty="0" err="1" smtClean="0">
+                <a:latin typeface="Times New Roman" pitchFamily="18" charset="0"/>
+                <a:cs typeface="Times New Roman" pitchFamily="18" charset="0"/>
+                <a:sym typeface="Wingdings" pitchFamily="2" charset="2"/>
+              </a:rPr>
+              <a:t>Cập</a:t>
+            </a:r>
+            <a:r>
+              <a:rPr lang="en-US" sz="2000" dirty="0" smtClean="0">
+                <a:latin typeface="Times New Roman" pitchFamily="18" charset="0"/>
+                <a:cs typeface="Times New Roman" pitchFamily="18" charset="0"/>
+                <a:sym typeface="Wingdings" pitchFamily="2" charset="2"/>
+              </a:rPr>
+              <a:t> </a:t>
+            </a:r>
+            <a:r>
+              <a:rPr lang="en-US" sz="2000" dirty="0" err="1" smtClean="0">
+                <a:latin typeface="Times New Roman" pitchFamily="18" charset="0"/>
+                <a:cs typeface="Times New Roman" pitchFamily="18" charset="0"/>
+                <a:sym typeface="Wingdings" pitchFamily="2" charset="2"/>
+              </a:rPr>
+              <a:t>nhật</a:t>
+            </a:r>
+            <a:r>
+              <a:rPr lang="en-US" sz="2000" dirty="0" smtClean="0">
+                <a:latin typeface="Times New Roman" pitchFamily="18" charset="0"/>
+                <a:cs typeface="Times New Roman" pitchFamily="18" charset="0"/>
+                <a:sym typeface="Wingdings" pitchFamily="2" charset="2"/>
+              </a:rPr>
+              <a:t> abstract </a:t>
+            </a:r>
+            <a:r>
+              <a:rPr lang="en-US" sz="2000" dirty="0" err="1" smtClean="0">
+                <a:latin typeface="Times New Roman" pitchFamily="18" charset="0"/>
+                <a:cs typeface="Times New Roman" pitchFamily="18" charset="0"/>
+                <a:sym typeface="Wingdings" pitchFamily="2" charset="2"/>
+              </a:rPr>
+              <a:t>cho</a:t>
+            </a:r>
+            <a:r>
+              <a:rPr lang="en-US" sz="2000" dirty="0" smtClean="0">
+                <a:latin typeface="Times New Roman" pitchFamily="18" charset="0"/>
+                <a:cs typeface="Times New Roman" pitchFamily="18" charset="0"/>
+                <a:sym typeface="Wingdings" pitchFamily="2" charset="2"/>
+              </a:rPr>
+              <a:t> </a:t>
+            </a:r>
+            <a:r>
+              <a:rPr lang="en-US" sz="2000" dirty="0" err="1" smtClean="0">
+                <a:latin typeface="Times New Roman" pitchFamily="18" charset="0"/>
+                <a:cs typeface="Times New Roman" pitchFamily="18" charset="0"/>
+                <a:sym typeface="Wingdings" pitchFamily="2" charset="2"/>
+              </a:rPr>
+              <a:t>các</a:t>
+            </a:r>
+            <a:r>
+              <a:rPr lang="en-US" sz="2000" dirty="0" smtClean="0">
+                <a:latin typeface="Times New Roman" pitchFamily="18" charset="0"/>
+                <a:cs typeface="Times New Roman" pitchFamily="18" charset="0"/>
+                <a:sym typeface="Wingdings" pitchFamily="2" charset="2"/>
+              </a:rPr>
+              <a:t> </a:t>
+            </a:r>
+            <a:r>
+              <a:rPr lang="en-US" sz="2000" dirty="0" err="1" smtClean="0">
+                <a:latin typeface="Times New Roman" pitchFamily="18" charset="0"/>
+                <a:cs typeface="Times New Roman" pitchFamily="18" charset="0"/>
+                <a:sym typeface="Wingdings" pitchFamily="2" charset="2"/>
+              </a:rPr>
+              <a:t>bài</a:t>
+            </a:r>
+            <a:r>
+              <a:rPr lang="en-US" sz="2000" dirty="0" smtClean="0">
+                <a:latin typeface="Times New Roman" pitchFamily="18" charset="0"/>
+                <a:cs typeface="Times New Roman" pitchFamily="18" charset="0"/>
+                <a:sym typeface="Wingdings" pitchFamily="2" charset="2"/>
+              </a:rPr>
+              <a:t> </a:t>
+            </a:r>
+            <a:r>
+              <a:rPr lang="en-US" sz="2000" dirty="0" err="1" smtClean="0">
+                <a:latin typeface="Times New Roman" pitchFamily="18" charset="0"/>
+                <a:cs typeface="Times New Roman" pitchFamily="18" charset="0"/>
+                <a:sym typeface="Wingdings" pitchFamily="2" charset="2"/>
+              </a:rPr>
               <a:t>báo</a:t>
             </a:r>
             <a:r>
-              <a:rPr lang="en-US" dirty="0" smtClean="0"/>
+              <a:rPr lang="en-US" sz="2000" dirty="0" smtClean="0">
+                <a:latin typeface="Times New Roman" pitchFamily="18" charset="0"/>
+                <a:cs typeface="Times New Roman" pitchFamily="18" charset="0"/>
+                <a:sym typeface="Wingdings" pitchFamily="2" charset="2"/>
+              </a:rPr>
+              <a:t> </a:t>
+            </a:r>
+            <a:r>
+              <a:rPr lang="en-US" sz="2000" dirty="0" err="1" smtClean="0">
+                <a:latin typeface="Times New Roman" pitchFamily="18" charset="0"/>
+                <a:cs typeface="Times New Roman" pitchFamily="18" charset="0"/>
+                <a:sym typeface="Wingdings" pitchFamily="2" charset="2"/>
+              </a:rPr>
+              <a:t>trong</a:t>
+            </a:r>
+            <a:r>
+              <a:rPr lang="en-US" sz="2000" dirty="0" smtClean="0">
+                <a:latin typeface="Times New Roman" pitchFamily="18" charset="0"/>
+                <a:cs typeface="Times New Roman" pitchFamily="18" charset="0"/>
+                <a:sym typeface="Wingdings" pitchFamily="2" charset="2"/>
+              </a:rPr>
+              <a:t> </a:t>
+            </a:r>
+            <a:r>
+              <a:rPr lang="en-US" sz="2000" dirty="0" err="1" smtClean="0">
+                <a:latin typeface="Times New Roman" pitchFamily="18" charset="0"/>
+                <a:cs typeface="Times New Roman" pitchFamily="18" charset="0"/>
+                <a:sym typeface="Wingdings" pitchFamily="2" charset="2"/>
+              </a:rPr>
+              <a:t>dữ</a:t>
+            </a:r>
+            <a:r>
+              <a:rPr lang="en-US" sz="2000" dirty="0" smtClean="0">
+                <a:latin typeface="Times New Roman" pitchFamily="18" charset="0"/>
+                <a:cs typeface="Times New Roman" pitchFamily="18" charset="0"/>
+                <a:sym typeface="Wingdings" pitchFamily="2" charset="2"/>
+              </a:rPr>
+              <a:t> </a:t>
+            </a:r>
+            <a:r>
+              <a:rPr lang="en-US" sz="2000" dirty="0" err="1" smtClean="0">
+                <a:latin typeface="Times New Roman" pitchFamily="18" charset="0"/>
+                <a:cs typeface="Times New Roman" pitchFamily="18" charset="0"/>
+                <a:sym typeface="Wingdings" pitchFamily="2" charset="2"/>
+              </a:rPr>
+              <a:t>liệu</a:t>
+            </a:r>
+            <a:r>
+              <a:rPr lang="en-US" sz="2000" dirty="0" smtClean="0">
+                <a:latin typeface="Times New Roman" pitchFamily="18" charset="0"/>
+                <a:cs typeface="Times New Roman" pitchFamily="18" charset="0"/>
+                <a:sym typeface="Wingdings" pitchFamily="2" charset="2"/>
+              </a:rPr>
+              <a:t> </a:t>
+            </a:r>
+            <a:r>
+              <a:rPr lang="en-US" sz="2000" dirty="0" err="1" smtClean="0">
+                <a:latin typeface="Times New Roman" pitchFamily="18" charset="0"/>
+                <a:cs typeface="Times New Roman" pitchFamily="18" charset="0"/>
+                <a:sym typeface="Wingdings" pitchFamily="2" charset="2"/>
+              </a:rPr>
+              <a:t>chỉ</a:t>
+            </a:r>
+            <a:r>
+              <a:rPr lang="en-US" sz="2000" dirty="0" smtClean="0">
+                <a:latin typeface="Times New Roman" pitchFamily="18" charset="0"/>
+                <a:cs typeface="Times New Roman" pitchFamily="18" charset="0"/>
+                <a:sym typeface="Wingdings" pitchFamily="2" charset="2"/>
+              </a:rPr>
+              <a:t> </a:t>
+            </a:r>
+            <a:r>
+              <a:rPr lang="en-US" sz="2000" dirty="0" err="1" smtClean="0">
+                <a:latin typeface="Times New Roman" pitchFamily="18" charset="0"/>
+                <a:cs typeface="Times New Roman" pitchFamily="18" charset="0"/>
+                <a:sym typeface="Wingdings" pitchFamily="2" charset="2"/>
+              </a:rPr>
+              <a:t>mục</a:t>
+            </a:r>
+            <a:r>
+              <a:rPr lang="en-US" sz="2000" dirty="0" smtClean="0">
+                <a:latin typeface="Times New Roman" pitchFamily="18" charset="0"/>
+                <a:cs typeface="Times New Roman" pitchFamily="18" charset="0"/>
+                <a:sym typeface="Wingdings" pitchFamily="2" charset="2"/>
+              </a:rPr>
+              <a:t> DBLP</a:t>
+            </a:r>
+            <a:r>
+              <a:rPr lang="en-US" sz="2000" dirty="0" smtClean="0">
+                <a:latin typeface="Times New Roman" pitchFamily="18" charset="0"/>
+                <a:cs typeface="Times New Roman" pitchFamily="18" charset="0"/>
+                <a:sym typeface="Wingdings" pitchFamily="2" charset="2"/>
+              </a:rPr>
               <a:t>.</a:t>
             </a:r>
           </a:p>
           <a:p>
-            <a:r>
-              <a:rPr lang="en-US" dirty="0" err="1" smtClean="0"/>
-              <a:t>Phạm</a:t>
-            </a:r>
-            <a:r>
-              <a:rPr lang="en-US" dirty="0" smtClean="0"/>
-              <a:t> vi </a:t>
-            </a:r>
-            <a:r>
-              <a:rPr lang="en-US" dirty="0" err="1" smtClean="0"/>
-              <a:t>phân</a:t>
-            </a:r>
-            <a:r>
-              <a:rPr lang="en-US" dirty="0" smtClean="0"/>
-              <a:t> </a:t>
-            </a:r>
-            <a:r>
-              <a:rPr lang="en-US" dirty="0" err="1" smtClean="0"/>
-              <a:t>loại</a:t>
-            </a:r>
-            <a:r>
-              <a:rPr lang="en-US" dirty="0" smtClean="0"/>
-              <a:t> </a:t>
-            </a:r>
-            <a:r>
-              <a:rPr lang="en-US" dirty="0" err="1" smtClean="0"/>
-              <a:t>chủ</a:t>
-            </a:r>
-            <a:r>
-              <a:rPr lang="en-US" dirty="0" smtClean="0"/>
-              <a:t> </a:t>
-            </a:r>
-            <a:r>
-              <a:rPr lang="en-US" dirty="0" err="1" smtClean="0"/>
-              <a:t>đề</a:t>
-            </a:r>
-            <a:r>
-              <a:rPr lang="en-US" dirty="0" smtClean="0"/>
-              <a:t> </a:t>
-            </a:r>
-            <a:r>
-              <a:rPr lang="en-US" dirty="0" err="1" smtClean="0"/>
-              <a:t>thuộc</a:t>
-            </a:r>
-            <a:r>
-              <a:rPr lang="en-US" dirty="0" smtClean="0"/>
-              <a:t> </a:t>
-            </a:r>
-            <a:r>
-              <a:rPr lang="en-US" dirty="0" err="1" smtClean="0"/>
-              <a:t>khoa</a:t>
-            </a:r>
-            <a:r>
-              <a:rPr lang="en-US" dirty="0" smtClean="0"/>
-              <a:t> </a:t>
-            </a:r>
-            <a:r>
-              <a:rPr lang="en-US" dirty="0" err="1" smtClean="0"/>
-              <a:t>học</a:t>
-            </a:r>
-            <a:r>
-              <a:rPr lang="en-US" dirty="0" smtClean="0"/>
-              <a:t> </a:t>
-            </a:r>
-            <a:r>
-              <a:rPr lang="en-US" dirty="0" err="1" smtClean="0"/>
-              <a:t>máy</a:t>
-            </a:r>
-            <a:r>
-              <a:rPr lang="en-US" dirty="0" smtClean="0"/>
-              <a:t> </a:t>
-            </a:r>
-            <a:r>
-              <a:rPr lang="en-US" dirty="0" err="1" smtClean="0"/>
-              <a:t>tính</a:t>
-            </a:r>
-            <a:r>
-              <a:rPr lang="en-US" dirty="0" smtClean="0"/>
-              <a:t> (</a:t>
-            </a:r>
-            <a:r>
-              <a:rPr lang="en-US" dirty="0" err="1" smtClean="0"/>
+            <a:pPr>
+              <a:buNone/>
+            </a:pPr>
+            <a:r>
+              <a:rPr lang="en-US" sz="2000" dirty="0" smtClean="0">
+                <a:latin typeface="Times New Roman" pitchFamily="18" charset="0"/>
+                <a:cs typeface="Times New Roman" pitchFamily="18" charset="0"/>
+                <a:sym typeface="Wingdings" pitchFamily="2" charset="2"/>
+              </a:rPr>
+              <a:t>	</a:t>
+            </a:r>
+            <a:r>
+              <a:rPr lang="en-US" sz="2000" dirty="0" smtClean="0">
+                <a:latin typeface="Times New Roman" pitchFamily="18" charset="0"/>
+                <a:cs typeface="Times New Roman" pitchFamily="18" charset="0"/>
+                <a:sym typeface="Wingdings" pitchFamily="2" charset="2"/>
+              </a:rPr>
+              <a:t>	+ </a:t>
+            </a:r>
+            <a:r>
+              <a:rPr lang="en-US" sz="2000" dirty="0" err="1" smtClean="0">
+                <a:latin typeface="Times New Roman" pitchFamily="18" charset="0"/>
+                <a:cs typeface="Times New Roman" pitchFamily="18" charset="0"/>
+                <a:sym typeface="Wingdings" pitchFamily="2" charset="2"/>
+              </a:rPr>
+              <a:t>Dùng</a:t>
+            </a:r>
+            <a:r>
+              <a:rPr lang="en-US" sz="2000" dirty="0" smtClean="0">
+                <a:latin typeface="Times New Roman" pitchFamily="18" charset="0"/>
+                <a:cs typeface="Times New Roman" pitchFamily="18" charset="0"/>
+                <a:sym typeface="Wingdings" pitchFamily="2" charset="2"/>
+              </a:rPr>
+              <a:t> title </a:t>
+            </a:r>
+            <a:r>
+              <a:rPr lang="en-US" sz="2000" dirty="0" err="1" smtClean="0">
+                <a:latin typeface="Times New Roman" pitchFamily="18" charset="0"/>
+                <a:cs typeface="Times New Roman" pitchFamily="18" charset="0"/>
+                <a:sym typeface="Wingdings" pitchFamily="2" charset="2"/>
+              </a:rPr>
+              <a:t>bỏ</a:t>
+            </a:r>
+            <a:r>
+              <a:rPr lang="en-US" sz="2000" dirty="0" smtClean="0">
+                <a:latin typeface="Times New Roman" pitchFamily="18" charset="0"/>
+                <a:cs typeface="Times New Roman" pitchFamily="18" charset="0"/>
+                <a:sym typeface="Wingdings" pitchFamily="2" charset="2"/>
+              </a:rPr>
+              <a:t> </a:t>
+            </a:r>
+            <a:r>
+              <a:rPr lang="en-US" sz="2000" dirty="0" err="1" smtClean="0">
+                <a:latin typeface="Times New Roman" pitchFamily="18" charset="0"/>
+                <a:cs typeface="Times New Roman" pitchFamily="18" charset="0"/>
+                <a:sym typeface="Wingdings" pitchFamily="2" charset="2"/>
+              </a:rPr>
+              <a:t>lên</a:t>
+            </a:r>
+            <a:r>
+              <a:rPr lang="en-US" sz="2000" dirty="0" smtClean="0">
+                <a:latin typeface="Times New Roman" pitchFamily="18" charset="0"/>
+                <a:cs typeface="Times New Roman" pitchFamily="18" charset="0"/>
+                <a:sym typeface="Wingdings" pitchFamily="2" charset="2"/>
+              </a:rPr>
+              <a:t> search engine </a:t>
+            </a:r>
+            <a:r>
+              <a:rPr lang="en-US" sz="2000" dirty="0" err="1" smtClean="0">
+                <a:latin typeface="Times New Roman" pitchFamily="18" charset="0"/>
+                <a:cs typeface="Times New Roman" pitchFamily="18" charset="0"/>
+                <a:sym typeface="Wingdings" pitchFamily="2" charset="2"/>
+              </a:rPr>
+              <a:t>như</a:t>
+            </a:r>
+            <a:r>
+              <a:rPr lang="en-US" sz="2000" dirty="0" smtClean="0">
+                <a:latin typeface="Times New Roman" pitchFamily="18" charset="0"/>
+                <a:cs typeface="Times New Roman" pitchFamily="18" charset="0"/>
+                <a:sym typeface="Wingdings" pitchFamily="2" charset="2"/>
+              </a:rPr>
+              <a:t> </a:t>
+            </a:r>
+            <a:r>
+              <a:rPr lang="en-US" sz="2000" dirty="0" err="1" smtClean="0">
+                <a:latin typeface="Times New Roman" pitchFamily="18" charset="0"/>
+                <a:cs typeface="Times New Roman" pitchFamily="18" charset="0"/>
+                <a:sym typeface="Wingdings" pitchFamily="2" charset="2"/>
+              </a:rPr>
+              <a:t>google,yahoo</a:t>
+            </a:r>
+            <a:r>
+              <a:rPr lang="en-US" sz="2000" dirty="0" smtClean="0">
+                <a:latin typeface="Times New Roman" pitchFamily="18" charset="0"/>
+                <a:cs typeface="Times New Roman" pitchFamily="18" charset="0"/>
+                <a:sym typeface="Wingdings" pitchFamily="2" charset="2"/>
+              </a:rPr>
+              <a:t>.</a:t>
+            </a:r>
+          </a:p>
+          <a:p>
+            <a:pPr>
+              <a:buNone/>
+            </a:pPr>
+            <a:r>
+              <a:rPr lang="en-US" sz="2000" dirty="0" smtClean="0">
+                <a:latin typeface="Times New Roman" pitchFamily="18" charset="0"/>
+                <a:cs typeface="Times New Roman" pitchFamily="18" charset="0"/>
+                <a:sym typeface="Wingdings" pitchFamily="2" charset="2"/>
+              </a:rPr>
+              <a:t>		+ </a:t>
+            </a:r>
+            <a:r>
+              <a:rPr lang="en-US" sz="2000" dirty="0" err="1" smtClean="0">
+                <a:latin typeface="Times New Roman" pitchFamily="18" charset="0"/>
+                <a:cs typeface="Times New Roman" pitchFamily="18" charset="0"/>
+                <a:sym typeface="Wingdings" pitchFamily="2" charset="2"/>
+              </a:rPr>
+              <a:t>Dùng</a:t>
+            </a:r>
+            <a:r>
+              <a:rPr lang="en-US" sz="2000" dirty="0" smtClean="0">
+                <a:latin typeface="Times New Roman" pitchFamily="18" charset="0"/>
+                <a:cs typeface="Times New Roman" pitchFamily="18" charset="0"/>
+                <a:sym typeface="Wingdings" pitchFamily="2" charset="2"/>
+              </a:rPr>
+              <a:t> title </a:t>
+            </a:r>
+            <a:r>
+              <a:rPr lang="en-US" sz="2000" dirty="0" err="1" smtClean="0">
+                <a:latin typeface="Times New Roman" pitchFamily="18" charset="0"/>
+                <a:cs typeface="Times New Roman" pitchFamily="18" charset="0"/>
+                <a:sym typeface="Wingdings" pitchFamily="2" charset="2"/>
+              </a:rPr>
+              <a:t>đưa</a:t>
+            </a:r>
+            <a:r>
+              <a:rPr lang="en-US" sz="2000" dirty="0" smtClean="0">
+                <a:latin typeface="Times New Roman" pitchFamily="18" charset="0"/>
+                <a:cs typeface="Times New Roman" pitchFamily="18" charset="0"/>
+                <a:sym typeface="Wingdings" pitchFamily="2" charset="2"/>
+              </a:rPr>
+              <a:t> </a:t>
+            </a:r>
+            <a:r>
+              <a:rPr lang="en-US" sz="2000" dirty="0" err="1" smtClean="0">
+                <a:latin typeface="Times New Roman" pitchFamily="18" charset="0"/>
+                <a:cs typeface="Times New Roman" pitchFamily="18" charset="0"/>
+                <a:sym typeface="Wingdings" pitchFamily="2" charset="2"/>
+              </a:rPr>
+              <a:t>lên</a:t>
+            </a:r>
+            <a:r>
+              <a:rPr lang="en-US" sz="2000" dirty="0" smtClean="0">
+                <a:latin typeface="Times New Roman" pitchFamily="18" charset="0"/>
+                <a:cs typeface="Times New Roman" pitchFamily="18" charset="0"/>
+                <a:sym typeface="Wingdings" pitchFamily="2" charset="2"/>
+              </a:rPr>
+              <a:t> </a:t>
+            </a:r>
+            <a:r>
+              <a:rPr lang="en-US" sz="2000" dirty="0" err="1" smtClean="0">
+                <a:latin typeface="Times New Roman" pitchFamily="18" charset="0"/>
+                <a:cs typeface="Times New Roman" pitchFamily="18" charset="0"/>
+                <a:sym typeface="Wingdings" pitchFamily="2" charset="2"/>
+              </a:rPr>
+              <a:t>trực</a:t>
+            </a:r>
+            <a:r>
+              <a:rPr lang="en-US" sz="2000" dirty="0" smtClean="0">
+                <a:latin typeface="Times New Roman" pitchFamily="18" charset="0"/>
+                <a:cs typeface="Times New Roman" pitchFamily="18" charset="0"/>
+                <a:sym typeface="Wingdings" pitchFamily="2" charset="2"/>
+              </a:rPr>
+              <a:t> </a:t>
+            </a:r>
+            <a:r>
+              <a:rPr lang="en-US" sz="2000" dirty="0" err="1" smtClean="0">
+                <a:latin typeface="Times New Roman" pitchFamily="18" charset="0"/>
+                <a:cs typeface="Times New Roman" pitchFamily="18" charset="0"/>
+                <a:sym typeface="Wingdings" pitchFamily="2" charset="2"/>
+              </a:rPr>
+              <a:t>tiếp</a:t>
+            </a:r>
+            <a:r>
+              <a:rPr lang="en-US" sz="2000" dirty="0" smtClean="0">
+                <a:latin typeface="Times New Roman" pitchFamily="18" charset="0"/>
+                <a:cs typeface="Times New Roman" pitchFamily="18" charset="0"/>
+                <a:sym typeface="Wingdings" pitchFamily="2" charset="2"/>
+              </a:rPr>
+              <a:t> 1 </a:t>
+            </a:r>
+            <a:r>
+              <a:rPr lang="en-US" sz="2000" dirty="0" err="1" smtClean="0">
+                <a:latin typeface="Times New Roman" pitchFamily="18" charset="0"/>
+                <a:cs typeface="Times New Roman" pitchFamily="18" charset="0"/>
+                <a:sym typeface="Wingdings" pitchFamily="2" charset="2"/>
+              </a:rPr>
+              <a:t>thư</a:t>
+            </a:r>
+            <a:r>
+              <a:rPr lang="en-US" sz="2000" dirty="0" smtClean="0">
+                <a:latin typeface="Times New Roman" pitchFamily="18" charset="0"/>
+                <a:cs typeface="Times New Roman" pitchFamily="18" charset="0"/>
+                <a:sym typeface="Wingdings" pitchFamily="2" charset="2"/>
+              </a:rPr>
+              <a:t> </a:t>
+            </a:r>
+            <a:r>
+              <a:rPr lang="en-US" sz="2000" dirty="0" err="1" smtClean="0">
+                <a:latin typeface="Times New Roman" pitchFamily="18" charset="0"/>
+                <a:cs typeface="Times New Roman" pitchFamily="18" charset="0"/>
+                <a:sym typeface="Wingdings" pitchFamily="2" charset="2"/>
+              </a:rPr>
+              <a:t>viện</a:t>
+            </a:r>
+            <a:r>
+              <a:rPr lang="en-US" sz="2000" dirty="0" smtClean="0">
+                <a:latin typeface="Times New Roman" pitchFamily="18" charset="0"/>
+                <a:cs typeface="Times New Roman" pitchFamily="18" charset="0"/>
+                <a:sym typeface="Wingdings" pitchFamily="2" charset="2"/>
+              </a:rPr>
+              <a:t> </a:t>
+            </a:r>
+            <a:r>
+              <a:rPr lang="en-US" sz="2000" dirty="0" err="1" smtClean="0">
+                <a:latin typeface="Times New Roman" pitchFamily="18" charset="0"/>
+                <a:cs typeface="Times New Roman" pitchFamily="18" charset="0"/>
+                <a:sym typeface="Wingdings" pitchFamily="2" charset="2"/>
+              </a:rPr>
+              <a:t>số</a:t>
+            </a:r>
+            <a:r>
+              <a:rPr lang="en-US" sz="2000" dirty="0" smtClean="0">
+                <a:latin typeface="Times New Roman" pitchFamily="18" charset="0"/>
+                <a:cs typeface="Times New Roman" pitchFamily="18" charset="0"/>
+                <a:sym typeface="Wingdings" pitchFamily="2" charset="2"/>
+              </a:rPr>
+              <a:t> </a:t>
+            </a:r>
+            <a:r>
+              <a:rPr lang="en-US" sz="2000" dirty="0" err="1" smtClean="0">
+                <a:latin typeface="Times New Roman" pitchFamily="18" charset="0"/>
+                <a:cs typeface="Times New Roman" pitchFamily="18" charset="0"/>
+                <a:sym typeface="Wingdings" pitchFamily="2" charset="2"/>
+              </a:rPr>
+              <a:t>để</a:t>
+            </a:r>
+            <a:r>
+              <a:rPr lang="en-US" sz="2000" dirty="0" smtClean="0">
+                <a:latin typeface="Times New Roman" pitchFamily="18" charset="0"/>
+                <a:cs typeface="Times New Roman" pitchFamily="18" charset="0"/>
+                <a:sym typeface="Wingdings" pitchFamily="2" charset="2"/>
+              </a:rPr>
+              <a:t> </a:t>
+            </a:r>
+            <a:r>
+              <a:rPr lang="en-US" sz="2000" dirty="0" err="1" smtClean="0">
+                <a:latin typeface="Times New Roman" pitchFamily="18" charset="0"/>
+                <a:cs typeface="Times New Roman" pitchFamily="18" charset="0"/>
+                <a:sym typeface="Wingdings" pitchFamily="2" charset="2"/>
+              </a:rPr>
+              <a:t>lấy</a:t>
+            </a:r>
+            <a:r>
+              <a:rPr lang="en-US" sz="2000" dirty="0" smtClean="0">
+                <a:latin typeface="Times New Roman" pitchFamily="18" charset="0"/>
+                <a:cs typeface="Times New Roman" pitchFamily="18" charset="0"/>
+                <a:sym typeface="Wingdings" pitchFamily="2" charset="2"/>
+              </a:rPr>
+              <a:t> abstract </a:t>
+            </a:r>
+            <a:r>
+              <a:rPr lang="en-US" sz="2000" dirty="0" err="1" smtClean="0">
+                <a:latin typeface="Times New Roman" pitchFamily="18" charset="0"/>
+                <a:cs typeface="Times New Roman" pitchFamily="18" charset="0"/>
+                <a:sym typeface="Wingdings" pitchFamily="2" charset="2"/>
+              </a:rPr>
+              <a:t>về</a:t>
+            </a:r>
+            <a:r>
+              <a:rPr lang="en-US" sz="2000" dirty="0" smtClean="0">
+                <a:latin typeface="Times New Roman" pitchFamily="18" charset="0"/>
+                <a:cs typeface="Times New Roman" pitchFamily="18" charset="0"/>
+                <a:sym typeface="Wingdings" pitchFamily="2" charset="2"/>
+              </a:rPr>
+              <a:t>.</a:t>
+            </a:r>
+          </a:p>
+          <a:p>
+            <a:pPr>
+              <a:buNone/>
+            </a:pPr>
+            <a:endParaRPr lang="en-US" sz="2000" dirty="0" smtClean="0">
+              <a:latin typeface="Times New Roman" pitchFamily="18" charset="0"/>
+              <a:cs typeface="Times New Roman" pitchFamily="18" charset="0"/>
+              <a:sym typeface="Wingdings" pitchFamily="2" charset="2"/>
+            </a:endParaRPr>
+          </a:p>
+          <a:p>
+            <a:r>
+              <a:rPr lang="en-US" sz="2000" dirty="0" err="1" smtClean="0">
+                <a:latin typeface="Times New Roman" pitchFamily="18" charset="0"/>
+                <a:cs typeface="Times New Roman" pitchFamily="18" charset="0"/>
+                <a:sym typeface="Wingdings" pitchFamily="2" charset="2"/>
+              </a:rPr>
+              <a:t>Dựa</a:t>
+            </a:r>
+            <a:r>
+              <a:rPr lang="en-US" sz="2000" dirty="0" smtClean="0">
+                <a:latin typeface="Times New Roman" pitchFamily="18" charset="0"/>
+                <a:cs typeface="Times New Roman" pitchFamily="18" charset="0"/>
+                <a:sym typeface="Wingdings" pitchFamily="2" charset="2"/>
+              </a:rPr>
+              <a:t> </a:t>
+            </a:r>
+            <a:r>
+              <a:rPr lang="en-US" sz="2000" dirty="0" err="1" smtClean="0">
+                <a:latin typeface="Times New Roman" pitchFamily="18" charset="0"/>
+                <a:cs typeface="Times New Roman" pitchFamily="18" charset="0"/>
+                <a:sym typeface="Wingdings" pitchFamily="2" charset="2"/>
+              </a:rPr>
+              <a:t>vào</a:t>
+            </a:r>
+            <a:r>
+              <a:rPr lang="en-US" sz="2000" dirty="0" smtClean="0">
+                <a:latin typeface="Times New Roman" pitchFamily="18" charset="0"/>
+                <a:cs typeface="Times New Roman" pitchFamily="18" charset="0"/>
+                <a:sym typeface="Wingdings" pitchFamily="2" charset="2"/>
+              </a:rPr>
+              <a:t> </a:t>
+            </a:r>
+            <a:r>
+              <a:rPr lang="en-US" sz="2000" dirty="0" err="1" smtClean="0">
+                <a:latin typeface="Times New Roman" pitchFamily="18" charset="0"/>
+                <a:cs typeface="Times New Roman" pitchFamily="18" charset="0"/>
+                <a:sym typeface="Wingdings" pitchFamily="2" charset="2"/>
+              </a:rPr>
               <a:t>tên</a:t>
             </a:r>
             <a:r>
-              <a:rPr lang="en-US" dirty="0" smtClean="0"/>
-              <a:t> </a:t>
-            </a:r>
-            <a:r>
-              <a:rPr lang="en-US" dirty="0" err="1" smtClean="0"/>
-              <a:t>chủ</a:t>
-            </a:r>
-            <a:r>
-              <a:rPr lang="en-US" dirty="0" smtClean="0"/>
-              <a:t> </a:t>
-            </a:r>
-            <a:r>
-              <a:rPr lang="en-US" dirty="0" err="1" smtClean="0"/>
-              <a:t>đề</a:t>
-            </a:r>
-            <a:r>
-              <a:rPr lang="en-US" dirty="0" smtClean="0"/>
-              <a:t> </a:t>
-            </a:r>
-            <a:r>
-              <a:rPr lang="en-US" dirty="0" err="1" smtClean="0"/>
-              <a:t>được</a:t>
-            </a:r>
-            <a:r>
-              <a:rPr lang="en-US" dirty="0" smtClean="0"/>
-              <a:t> </a:t>
-            </a:r>
-            <a:r>
-              <a:rPr lang="en-US" dirty="0" err="1" smtClean="0"/>
-              <a:t>tham</a:t>
-            </a:r>
-            <a:r>
-              <a:rPr lang="en-US" dirty="0" smtClean="0"/>
-              <a:t> </a:t>
-            </a:r>
-            <a:r>
-              <a:rPr lang="en-US" dirty="0" err="1" smtClean="0"/>
-              <a:t>khảo</a:t>
-            </a:r>
-            <a:r>
-              <a:rPr lang="en-US" dirty="0" smtClean="0"/>
-              <a:t> </a:t>
-            </a:r>
-            <a:r>
-              <a:rPr lang="en-US" dirty="0" err="1" smtClean="0"/>
-              <a:t>từ</a:t>
-            </a:r>
-            <a:r>
-              <a:rPr lang="en-US" dirty="0" smtClean="0"/>
-              <a:t> wiki</a:t>
-            </a:r>
-            <a:r>
-              <a:rPr lang="en-US" dirty="0" smtClean="0"/>
-              <a:t>)</a:t>
-            </a:r>
-            <a:r>
-              <a:rPr lang="en-US" dirty="0" smtClean="0">
+              <a:rPr lang="en-US" sz="2000" dirty="0" smtClean="0">
+                <a:latin typeface="Times New Roman" pitchFamily="18" charset="0"/>
+                <a:cs typeface="Times New Roman" pitchFamily="18" charset="0"/>
                 <a:sym typeface="Wingdings" pitchFamily="2" charset="2"/>
               </a:rPr>
               <a:t> </a:t>
             </a:r>
-            <a:endParaRPr lang="en-US" dirty="0" smtClean="0"/>
+            <a:r>
+              <a:rPr lang="en-US" sz="2000" dirty="0" err="1" smtClean="0">
+                <a:latin typeface="Times New Roman" pitchFamily="18" charset="0"/>
+                <a:cs typeface="Times New Roman" pitchFamily="18" charset="0"/>
+                <a:sym typeface="Wingdings" pitchFamily="2" charset="2"/>
+              </a:rPr>
+              <a:t>tác</a:t>
+            </a:r>
+            <a:r>
+              <a:rPr lang="en-US" sz="2000" dirty="0" smtClean="0">
+                <a:latin typeface="Times New Roman" pitchFamily="18" charset="0"/>
+                <a:cs typeface="Times New Roman" pitchFamily="18" charset="0"/>
+                <a:sym typeface="Wingdings" pitchFamily="2" charset="2"/>
+              </a:rPr>
+              <a:t> </a:t>
+            </a:r>
+            <a:r>
+              <a:rPr lang="en-US" sz="2000" dirty="0" err="1" smtClean="0">
+                <a:latin typeface="Times New Roman" pitchFamily="18" charset="0"/>
+                <a:cs typeface="Times New Roman" pitchFamily="18" charset="0"/>
+                <a:sym typeface="Wingdings" pitchFamily="2" charset="2"/>
+              </a:rPr>
+              <a:t>giả</a:t>
+            </a:r>
+            <a:r>
+              <a:rPr lang="en-US" sz="2000" dirty="0" smtClean="0">
+                <a:latin typeface="Times New Roman" pitchFamily="18" charset="0"/>
+                <a:cs typeface="Times New Roman" pitchFamily="18" charset="0"/>
+                <a:sym typeface="Wingdings" pitchFamily="2" charset="2"/>
+              </a:rPr>
+              <a:t>  </a:t>
+            </a:r>
+            <a:r>
+              <a:rPr lang="en-US" sz="2000" dirty="0" err="1" smtClean="0">
+                <a:latin typeface="Times New Roman" pitchFamily="18" charset="0"/>
+                <a:cs typeface="Times New Roman" pitchFamily="18" charset="0"/>
+                <a:sym typeface="Wingdings" pitchFamily="2" charset="2"/>
+              </a:rPr>
+              <a:t>tìm</a:t>
+            </a:r>
+            <a:r>
+              <a:rPr lang="en-US" sz="2000" dirty="0" smtClean="0">
+                <a:latin typeface="Times New Roman" pitchFamily="18" charset="0"/>
+                <a:cs typeface="Times New Roman" pitchFamily="18" charset="0"/>
+                <a:sym typeface="Wingdings" pitchFamily="2" charset="2"/>
+              </a:rPr>
+              <a:t> </a:t>
+            </a:r>
+            <a:r>
+              <a:rPr lang="en-US" sz="2000" dirty="0" err="1" smtClean="0">
+                <a:latin typeface="Times New Roman" pitchFamily="18" charset="0"/>
+                <a:cs typeface="Times New Roman" pitchFamily="18" charset="0"/>
+                <a:sym typeface="Wingdings" pitchFamily="2" charset="2"/>
+              </a:rPr>
+              <a:t>trang</a:t>
+            </a:r>
+            <a:r>
+              <a:rPr lang="en-US" sz="2000" dirty="0" smtClean="0">
+                <a:latin typeface="Times New Roman" pitchFamily="18" charset="0"/>
+                <a:cs typeface="Times New Roman" pitchFamily="18" charset="0"/>
+                <a:sym typeface="Wingdings" pitchFamily="2" charset="2"/>
+              </a:rPr>
+              <a:t> web </a:t>
+            </a:r>
+            <a:r>
+              <a:rPr lang="en-US" sz="2000" dirty="0" err="1" smtClean="0">
+                <a:latin typeface="Times New Roman" pitchFamily="18" charset="0"/>
+                <a:cs typeface="Times New Roman" pitchFamily="18" charset="0"/>
+                <a:sym typeface="Wingdings" pitchFamily="2" charset="2"/>
+              </a:rPr>
+              <a:t>cá</a:t>
+            </a:r>
+            <a:r>
+              <a:rPr lang="en-US" sz="2000" dirty="0" smtClean="0">
+                <a:latin typeface="Times New Roman" pitchFamily="18" charset="0"/>
+                <a:cs typeface="Times New Roman" pitchFamily="18" charset="0"/>
+                <a:sym typeface="Wingdings" pitchFamily="2" charset="2"/>
+              </a:rPr>
+              <a:t> </a:t>
+            </a:r>
+            <a:r>
+              <a:rPr lang="en-US" sz="2000" dirty="0" err="1" smtClean="0">
+                <a:latin typeface="Times New Roman" pitchFamily="18" charset="0"/>
+                <a:cs typeface="Times New Roman" pitchFamily="18" charset="0"/>
+                <a:sym typeface="Wingdings" pitchFamily="2" charset="2"/>
+              </a:rPr>
+              <a:t>nhân</a:t>
+            </a:r>
+            <a:r>
+              <a:rPr lang="en-US" sz="2000" dirty="0" smtClean="0">
+                <a:latin typeface="Times New Roman" pitchFamily="18" charset="0"/>
+                <a:cs typeface="Times New Roman" pitchFamily="18" charset="0"/>
+                <a:sym typeface="Wingdings" pitchFamily="2" charset="2"/>
+              </a:rPr>
+              <a:t> </a:t>
+            </a:r>
+            <a:r>
+              <a:rPr lang="en-US" sz="2000" dirty="0" err="1" smtClean="0">
+                <a:latin typeface="Times New Roman" pitchFamily="18" charset="0"/>
+                <a:cs typeface="Times New Roman" pitchFamily="18" charset="0"/>
+                <a:sym typeface="Wingdings" pitchFamily="2" charset="2"/>
+              </a:rPr>
+              <a:t>của</a:t>
+            </a:r>
+            <a:r>
+              <a:rPr lang="en-US" sz="2000" dirty="0" smtClean="0">
+                <a:latin typeface="Times New Roman" pitchFamily="18" charset="0"/>
+                <a:cs typeface="Times New Roman" pitchFamily="18" charset="0"/>
+                <a:sym typeface="Wingdings" pitchFamily="2" charset="2"/>
+              </a:rPr>
+              <a:t> </a:t>
+            </a:r>
+            <a:r>
+              <a:rPr lang="en-US" sz="2000" dirty="0" err="1" smtClean="0">
+                <a:latin typeface="Times New Roman" pitchFamily="18" charset="0"/>
+                <a:cs typeface="Times New Roman" pitchFamily="18" charset="0"/>
+                <a:sym typeface="Wingdings" pitchFamily="2" charset="2"/>
+              </a:rPr>
+              <a:t>tác</a:t>
+            </a:r>
+            <a:r>
+              <a:rPr lang="en-US" sz="2000" dirty="0" smtClean="0">
+                <a:latin typeface="Times New Roman" pitchFamily="18" charset="0"/>
+                <a:cs typeface="Times New Roman" pitchFamily="18" charset="0"/>
+                <a:sym typeface="Wingdings" pitchFamily="2" charset="2"/>
+              </a:rPr>
+              <a:t> </a:t>
+            </a:r>
+            <a:r>
+              <a:rPr lang="en-US" sz="2000" dirty="0" err="1" smtClean="0">
+                <a:latin typeface="Times New Roman" pitchFamily="18" charset="0"/>
+                <a:cs typeface="Times New Roman" pitchFamily="18" charset="0"/>
+                <a:sym typeface="Wingdings" pitchFamily="2" charset="2"/>
+              </a:rPr>
+              <a:t>giả</a:t>
+            </a:r>
+            <a:r>
+              <a:rPr lang="en-US" sz="2000" dirty="0" smtClean="0">
+                <a:latin typeface="Times New Roman" pitchFamily="18" charset="0"/>
+                <a:cs typeface="Times New Roman" pitchFamily="18" charset="0"/>
+                <a:sym typeface="Wingdings" pitchFamily="2" charset="2"/>
+              </a:rPr>
+              <a:t>. </a:t>
+            </a:r>
+            <a:r>
+              <a:rPr lang="en-US" sz="2000" dirty="0" err="1" smtClean="0">
+                <a:latin typeface="Times New Roman" pitchFamily="18" charset="0"/>
+                <a:cs typeface="Times New Roman" pitchFamily="18" charset="0"/>
+                <a:sym typeface="Wingdings" pitchFamily="2" charset="2"/>
+              </a:rPr>
+              <a:t>Từ</a:t>
+            </a:r>
+            <a:r>
+              <a:rPr lang="en-US" sz="2000" dirty="0" smtClean="0">
+                <a:latin typeface="Times New Roman" pitchFamily="18" charset="0"/>
+                <a:cs typeface="Times New Roman" pitchFamily="18" charset="0"/>
+                <a:sym typeface="Wingdings" pitchFamily="2" charset="2"/>
+              </a:rPr>
+              <a:t> </a:t>
+            </a:r>
+            <a:r>
+              <a:rPr lang="en-US" sz="2000" dirty="0" err="1" smtClean="0">
+                <a:latin typeface="Times New Roman" pitchFamily="18" charset="0"/>
+                <a:cs typeface="Times New Roman" pitchFamily="18" charset="0"/>
+                <a:sym typeface="Wingdings" pitchFamily="2" charset="2"/>
+              </a:rPr>
+              <a:t>trang</a:t>
+            </a:r>
+            <a:r>
+              <a:rPr lang="en-US" sz="2000" dirty="0" smtClean="0">
+                <a:latin typeface="Times New Roman" pitchFamily="18" charset="0"/>
+                <a:cs typeface="Times New Roman" pitchFamily="18" charset="0"/>
+                <a:sym typeface="Wingdings" pitchFamily="2" charset="2"/>
+              </a:rPr>
+              <a:t> web </a:t>
+            </a:r>
+            <a:r>
+              <a:rPr lang="en-US" sz="2000" dirty="0" err="1" smtClean="0">
+                <a:latin typeface="Times New Roman" pitchFamily="18" charset="0"/>
+                <a:cs typeface="Times New Roman" pitchFamily="18" charset="0"/>
+                <a:sym typeface="Wingdings" pitchFamily="2" charset="2"/>
+              </a:rPr>
+              <a:t>này</a:t>
+            </a:r>
+            <a:r>
+              <a:rPr lang="en-US" sz="2000" dirty="0" smtClean="0">
+                <a:latin typeface="Times New Roman" pitchFamily="18" charset="0"/>
+                <a:cs typeface="Times New Roman" pitchFamily="18" charset="0"/>
+                <a:sym typeface="Wingdings" pitchFamily="2" charset="2"/>
+              </a:rPr>
+              <a:t> </a:t>
+            </a:r>
+            <a:r>
+              <a:rPr lang="en-US" sz="2000" dirty="0" err="1" smtClean="0">
+                <a:latin typeface="Times New Roman" pitchFamily="18" charset="0"/>
+                <a:cs typeface="Times New Roman" pitchFamily="18" charset="0"/>
+                <a:sym typeface="Wingdings" pitchFamily="2" charset="2"/>
+              </a:rPr>
+              <a:t>lấy</a:t>
+            </a:r>
+            <a:r>
+              <a:rPr lang="en-US" sz="2000" dirty="0" smtClean="0">
+                <a:latin typeface="Times New Roman" pitchFamily="18" charset="0"/>
+                <a:cs typeface="Times New Roman" pitchFamily="18" charset="0"/>
+                <a:sym typeface="Wingdings" pitchFamily="2" charset="2"/>
+              </a:rPr>
+              <a:t> </a:t>
+            </a:r>
+            <a:r>
+              <a:rPr lang="en-US" sz="2000" dirty="0" err="1" smtClean="0">
+                <a:latin typeface="Times New Roman" pitchFamily="18" charset="0"/>
+                <a:cs typeface="Times New Roman" pitchFamily="18" charset="0"/>
+                <a:sym typeface="Wingdings" pitchFamily="2" charset="2"/>
+              </a:rPr>
+              <a:t>thông</a:t>
+            </a:r>
+            <a:r>
+              <a:rPr lang="en-US" sz="2000" dirty="0" smtClean="0">
+                <a:latin typeface="Times New Roman" pitchFamily="18" charset="0"/>
+                <a:cs typeface="Times New Roman" pitchFamily="18" charset="0"/>
+                <a:sym typeface="Wingdings" pitchFamily="2" charset="2"/>
+              </a:rPr>
+              <a:t> tin </a:t>
+            </a:r>
+            <a:r>
+              <a:rPr lang="en-US" sz="2000" dirty="0" err="1" smtClean="0">
+                <a:latin typeface="Times New Roman" pitchFamily="18" charset="0"/>
+                <a:cs typeface="Times New Roman" pitchFamily="18" charset="0"/>
+                <a:sym typeface="Wingdings" pitchFamily="2" charset="2"/>
+              </a:rPr>
+              <a:t>các</a:t>
+            </a:r>
+            <a:r>
+              <a:rPr lang="en-US" sz="2000" dirty="0" smtClean="0">
+                <a:latin typeface="Times New Roman" pitchFamily="18" charset="0"/>
+                <a:cs typeface="Times New Roman" pitchFamily="18" charset="0"/>
+                <a:sym typeface="Wingdings" pitchFamily="2" charset="2"/>
+              </a:rPr>
+              <a:t> </a:t>
+            </a:r>
+            <a:r>
+              <a:rPr lang="en-US" sz="2000" dirty="0" err="1" smtClean="0">
+                <a:latin typeface="Times New Roman" pitchFamily="18" charset="0"/>
+                <a:cs typeface="Times New Roman" pitchFamily="18" charset="0"/>
+                <a:sym typeface="Wingdings" pitchFamily="2" charset="2"/>
+              </a:rPr>
+              <a:t>bài</a:t>
+            </a:r>
+            <a:r>
+              <a:rPr lang="en-US" sz="2000" dirty="0" smtClean="0">
+                <a:latin typeface="Times New Roman" pitchFamily="18" charset="0"/>
+                <a:cs typeface="Times New Roman" pitchFamily="18" charset="0"/>
+                <a:sym typeface="Wingdings" pitchFamily="2" charset="2"/>
+              </a:rPr>
+              <a:t> </a:t>
+            </a:r>
+            <a:r>
+              <a:rPr lang="en-US" sz="2000" dirty="0" err="1" smtClean="0">
+                <a:latin typeface="Times New Roman" pitchFamily="18" charset="0"/>
+                <a:cs typeface="Times New Roman" pitchFamily="18" charset="0"/>
+                <a:sym typeface="Wingdings" pitchFamily="2" charset="2"/>
+              </a:rPr>
+              <a:t>báo</a:t>
+            </a:r>
+            <a:r>
+              <a:rPr lang="en-US" sz="2000" dirty="0" smtClean="0">
+                <a:latin typeface="Times New Roman" pitchFamily="18" charset="0"/>
+                <a:cs typeface="Times New Roman" pitchFamily="18" charset="0"/>
+                <a:sym typeface="Wingdings" pitchFamily="2" charset="2"/>
+              </a:rPr>
+              <a:t> </a:t>
+            </a:r>
+            <a:r>
+              <a:rPr lang="en-US" sz="2000" dirty="0" err="1" smtClean="0">
+                <a:latin typeface="Times New Roman" pitchFamily="18" charset="0"/>
+                <a:cs typeface="Times New Roman" pitchFamily="18" charset="0"/>
+                <a:sym typeface="Wingdings" pitchFamily="2" charset="2"/>
+              </a:rPr>
+              <a:t>để</a:t>
+            </a:r>
+            <a:r>
+              <a:rPr lang="en-US" sz="2000" dirty="0" smtClean="0">
+                <a:latin typeface="Times New Roman" pitchFamily="18" charset="0"/>
+                <a:cs typeface="Times New Roman" pitchFamily="18" charset="0"/>
+                <a:sym typeface="Wingdings" pitchFamily="2" charset="2"/>
+              </a:rPr>
+              <a:t> </a:t>
+            </a:r>
+            <a:r>
+              <a:rPr lang="en-US" sz="2000" dirty="0" err="1" smtClean="0">
+                <a:latin typeface="Times New Roman" pitchFamily="18" charset="0"/>
+                <a:cs typeface="Times New Roman" pitchFamily="18" charset="0"/>
+                <a:sym typeface="Wingdings" pitchFamily="2" charset="2"/>
+              </a:rPr>
+              <a:t>bổ</a:t>
+            </a:r>
+            <a:r>
+              <a:rPr lang="en-US" sz="2000" dirty="0" smtClean="0">
+                <a:latin typeface="Times New Roman" pitchFamily="18" charset="0"/>
+                <a:cs typeface="Times New Roman" pitchFamily="18" charset="0"/>
+                <a:sym typeface="Wingdings" pitchFamily="2" charset="2"/>
+              </a:rPr>
+              <a:t> </a:t>
+            </a:r>
+            <a:r>
+              <a:rPr lang="en-US" sz="2000" dirty="0" err="1" smtClean="0">
+                <a:latin typeface="Times New Roman" pitchFamily="18" charset="0"/>
+                <a:cs typeface="Times New Roman" pitchFamily="18" charset="0"/>
+                <a:sym typeface="Wingdings" pitchFamily="2" charset="2"/>
+              </a:rPr>
+              <a:t>xung</a:t>
+            </a:r>
+            <a:r>
+              <a:rPr lang="en-US" sz="2000" dirty="0" smtClean="0">
+                <a:latin typeface="Times New Roman" pitchFamily="18" charset="0"/>
+                <a:cs typeface="Times New Roman" pitchFamily="18" charset="0"/>
+                <a:sym typeface="Wingdings" pitchFamily="2" charset="2"/>
+              </a:rPr>
+              <a:t> </a:t>
+            </a:r>
+            <a:r>
+              <a:rPr lang="en-US" sz="2000" dirty="0" err="1" smtClean="0">
+                <a:latin typeface="Times New Roman" pitchFamily="18" charset="0"/>
+                <a:cs typeface="Times New Roman" pitchFamily="18" charset="0"/>
+                <a:sym typeface="Wingdings" pitchFamily="2" charset="2"/>
+              </a:rPr>
+              <a:t>và</a:t>
+            </a:r>
+            <a:r>
+              <a:rPr lang="en-US" sz="2000" dirty="0" smtClean="0">
+                <a:latin typeface="Times New Roman" pitchFamily="18" charset="0"/>
+                <a:cs typeface="Times New Roman" pitchFamily="18" charset="0"/>
+                <a:sym typeface="Wingdings" pitchFamily="2" charset="2"/>
+              </a:rPr>
+              <a:t> </a:t>
+            </a:r>
+            <a:r>
+              <a:rPr lang="en-US" sz="2000" dirty="0" err="1" smtClean="0">
+                <a:latin typeface="Times New Roman" pitchFamily="18" charset="0"/>
+                <a:cs typeface="Times New Roman" pitchFamily="18" charset="0"/>
+                <a:sym typeface="Wingdings" pitchFamily="2" charset="2"/>
+              </a:rPr>
+              <a:t>dữ</a:t>
+            </a:r>
+            <a:r>
+              <a:rPr lang="en-US" sz="2000" dirty="0" smtClean="0">
+                <a:latin typeface="Times New Roman" pitchFamily="18" charset="0"/>
+                <a:cs typeface="Times New Roman" pitchFamily="18" charset="0"/>
+                <a:sym typeface="Wingdings" pitchFamily="2" charset="2"/>
+              </a:rPr>
+              <a:t> </a:t>
+            </a:r>
+            <a:r>
+              <a:rPr lang="en-US" sz="2000" dirty="0" err="1" smtClean="0">
+                <a:latin typeface="Times New Roman" pitchFamily="18" charset="0"/>
+                <a:cs typeface="Times New Roman" pitchFamily="18" charset="0"/>
+                <a:sym typeface="Wingdings" pitchFamily="2" charset="2"/>
+              </a:rPr>
+              <a:t>liệu</a:t>
+            </a:r>
+            <a:r>
+              <a:rPr lang="en-US" sz="2000" dirty="0" smtClean="0">
+                <a:latin typeface="Times New Roman" pitchFamily="18" charset="0"/>
+                <a:cs typeface="Times New Roman" pitchFamily="18" charset="0"/>
+                <a:sym typeface="Wingdings" pitchFamily="2" charset="2"/>
+              </a:rPr>
+              <a:t>.</a:t>
+            </a:r>
+          </a:p>
+          <a:p>
+            <a:pPr lvl="1"/>
+            <a:r>
+              <a:rPr lang="en-US" sz="2000" dirty="0" err="1" smtClean="0">
+                <a:latin typeface="Times New Roman" pitchFamily="18" charset="0"/>
+                <a:cs typeface="Times New Roman" pitchFamily="18" charset="0"/>
+              </a:rPr>
+              <a:t>Dùng</a:t>
+            </a:r>
+            <a:r>
+              <a:rPr lang="en-US" sz="2000" dirty="0" smtClean="0">
+                <a:latin typeface="Times New Roman" pitchFamily="18" charset="0"/>
+                <a:cs typeface="Times New Roman" pitchFamily="18" charset="0"/>
+              </a:rPr>
+              <a:t>  </a:t>
+            </a:r>
+            <a:r>
+              <a:rPr lang="en-US" sz="2000" dirty="0" err="1" smtClean="0">
+                <a:latin typeface="Times New Roman" pitchFamily="18" charset="0"/>
+                <a:cs typeface="Times New Roman" pitchFamily="18" charset="0"/>
+              </a:rPr>
+              <a:t>tên</a:t>
+            </a:r>
+            <a:r>
+              <a:rPr lang="en-US" sz="2000" dirty="0" smtClean="0">
+                <a:latin typeface="Times New Roman" pitchFamily="18" charset="0"/>
+                <a:cs typeface="Times New Roman" pitchFamily="18" charset="0"/>
+              </a:rPr>
+              <a:t> </a:t>
+            </a:r>
+            <a:r>
+              <a:rPr lang="en-US" sz="2000" dirty="0" err="1" smtClean="0">
+                <a:latin typeface="Times New Roman" pitchFamily="18" charset="0"/>
+                <a:cs typeface="Times New Roman" pitchFamily="18" charset="0"/>
+              </a:rPr>
+              <a:t>tác</a:t>
+            </a:r>
+            <a:r>
+              <a:rPr lang="en-US" sz="2000" dirty="0" smtClean="0">
+                <a:latin typeface="Times New Roman" pitchFamily="18" charset="0"/>
+                <a:cs typeface="Times New Roman" pitchFamily="18" charset="0"/>
+              </a:rPr>
+              <a:t> </a:t>
+            </a:r>
+            <a:r>
+              <a:rPr lang="en-US" sz="2000" dirty="0" err="1" smtClean="0">
+                <a:latin typeface="Times New Roman" pitchFamily="18" charset="0"/>
+                <a:cs typeface="Times New Roman" pitchFamily="18" charset="0"/>
+              </a:rPr>
+              <a:t>giả</a:t>
+            </a:r>
+            <a:r>
+              <a:rPr lang="en-US" sz="2000" dirty="0" smtClean="0">
+                <a:latin typeface="Times New Roman" pitchFamily="18" charset="0"/>
+                <a:cs typeface="Times New Roman" pitchFamily="18" charset="0"/>
+              </a:rPr>
+              <a:t> </a:t>
+            </a:r>
+            <a:r>
+              <a:rPr lang="en-US" sz="2000" dirty="0" err="1" smtClean="0">
+                <a:latin typeface="Times New Roman" pitchFamily="18" charset="0"/>
+                <a:cs typeface="Times New Roman" pitchFamily="18" charset="0"/>
+              </a:rPr>
+              <a:t>đưa</a:t>
+            </a:r>
+            <a:r>
+              <a:rPr lang="en-US" sz="2000" dirty="0" smtClean="0">
+                <a:latin typeface="Times New Roman" pitchFamily="18" charset="0"/>
+                <a:cs typeface="Times New Roman" pitchFamily="18" charset="0"/>
+              </a:rPr>
+              <a:t> </a:t>
+            </a:r>
+            <a:r>
+              <a:rPr lang="en-US" sz="2000" dirty="0" err="1" smtClean="0">
+                <a:latin typeface="Times New Roman" pitchFamily="18" charset="0"/>
+                <a:cs typeface="Times New Roman" pitchFamily="18" charset="0"/>
+              </a:rPr>
+              <a:t>lên</a:t>
+            </a:r>
+            <a:r>
+              <a:rPr lang="en-US" sz="2000" dirty="0" smtClean="0">
+                <a:latin typeface="Times New Roman" pitchFamily="18" charset="0"/>
+                <a:cs typeface="Times New Roman" pitchFamily="18" charset="0"/>
+              </a:rPr>
+              <a:t> search </a:t>
+            </a:r>
+            <a:r>
+              <a:rPr lang="en-US" sz="2000" dirty="0" err="1" smtClean="0">
+                <a:latin typeface="Times New Roman" pitchFamily="18" charset="0"/>
+                <a:cs typeface="Times New Roman" pitchFamily="18" charset="0"/>
+              </a:rPr>
+              <a:t>Search</a:t>
+            </a:r>
+            <a:r>
+              <a:rPr lang="en-US" sz="2000" dirty="0" smtClean="0">
+                <a:latin typeface="Times New Roman" pitchFamily="18" charset="0"/>
+                <a:cs typeface="Times New Roman" pitchFamily="18" charset="0"/>
+              </a:rPr>
+              <a:t> engine  </a:t>
+            </a:r>
+            <a:r>
+              <a:rPr lang="en-US" sz="2000" dirty="0" err="1" smtClean="0">
+                <a:latin typeface="Times New Roman" pitchFamily="18" charset="0"/>
+                <a:cs typeface="Times New Roman" pitchFamily="18" charset="0"/>
+              </a:rPr>
+              <a:t>lấy</a:t>
+            </a:r>
+            <a:r>
+              <a:rPr lang="en-US" sz="2000" dirty="0" smtClean="0">
+                <a:latin typeface="Times New Roman" pitchFamily="18" charset="0"/>
+                <a:cs typeface="Times New Roman" pitchFamily="18" charset="0"/>
+              </a:rPr>
+              <a:t> </a:t>
+            </a:r>
+            <a:r>
+              <a:rPr lang="en-US" sz="2000" dirty="0" err="1" smtClean="0">
+                <a:latin typeface="Times New Roman" pitchFamily="18" charset="0"/>
+                <a:cs typeface="Times New Roman" pitchFamily="18" charset="0"/>
+              </a:rPr>
+              <a:t>về</a:t>
+            </a:r>
+            <a:r>
+              <a:rPr lang="en-US" sz="2000" dirty="0" smtClean="0">
+                <a:latin typeface="Times New Roman" pitchFamily="18" charset="0"/>
+                <a:cs typeface="Times New Roman" pitchFamily="18" charset="0"/>
+              </a:rPr>
+              <a:t> link homepage </a:t>
+            </a:r>
+            <a:r>
+              <a:rPr lang="en-US" sz="2000" dirty="0" err="1" smtClean="0">
+                <a:latin typeface="Times New Roman" pitchFamily="18" charset="0"/>
+                <a:cs typeface="Times New Roman" pitchFamily="18" charset="0"/>
+              </a:rPr>
+              <a:t>của</a:t>
+            </a:r>
+            <a:r>
+              <a:rPr lang="en-US" sz="2000" dirty="0" smtClean="0">
+                <a:latin typeface="Times New Roman" pitchFamily="18" charset="0"/>
+                <a:cs typeface="Times New Roman" pitchFamily="18" charset="0"/>
+              </a:rPr>
+              <a:t> </a:t>
+            </a:r>
+            <a:r>
+              <a:rPr lang="en-US" sz="2000" dirty="0" err="1" smtClean="0">
+                <a:latin typeface="Times New Roman" pitchFamily="18" charset="0"/>
+                <a:cs typeface="Times New Roman" pitchFamily="18" charset="0"/>
+              </a:rPr>
+              <a:t>tác</a:t>
+            </a:r>
+            <a:r>
+              <a:rPr lang="en-US" sz="2000" dirty="0" smtClean="0">
+                <a:latin typeface="Times New Roman" pitchFamily="18" charset="0"/>
+                <a:cs typeface="Times New Roman" pitchFamily="18" charset="0"/>
+              </a:rPr>
+              <a:t> </a:t>
+            </a:r>
+            <a:r>
+              <a:rPr lang="en-US" sz="2000" dirty="0" err="1" smtClean="0">
+                <a:latin typeface="Times New Roman" pitchFamily="18" charset="0"/>
+                <a:cs typeface="Times New Roman" pitchFamily="18" charset="0"/>
+              </a:rPr>
+              <a:t>giả</a:t>
+            </a:r>
+            <a:r>
+              <a:rPr lang="en-US" sz="2000" dirty="0" smtClean="0">
+                <a:latin typeface="Times New Roman" pitchFamily="18" charset="0"/>
+                <a:cs typeface="Times New Roman" pitchFamily="18" charset="0"/>
+              </a:rPr>
+              <a:t>.</a:t>
+            </a:r>
+          </a:p>
+          <a:p>
+            <a:pPr lvl="1"/>
+            <a:r>
+              <a:rPr lang="en-US" sz="2000" dirty="0" smtClean="0">
+                <a:latin typeface="Times New Roman" pitchFamily="18" charset="0"/>
+                <a:cs typeface="Times New Roman" pitchFamily="18" charset="0"/>
+              </a:rPr>
+              <a:t>Parse </a:t>
+            </a:r>
+            <a:r>
+              <a:rPr lang="en-US" sz="2000" dirty="0" err="1" smtClean="0">
+                <a:latin typeface="Times New Roman" pitchFamily="18" charset="0"/>
+                <a:cs typeface="Times New Roman" pitchFamily="18" charset="0"/>
+              </a:rPr>
+              <a:t>nội</a:t>
+            </a:r>
+            <a:r>
+              <a:rPr lang="en-US" sz="2000" dirty="0" smtClean="0">
+                <a:latin typeface="Times New Roman" pitchFamily="18" charset="0"/>
+                <a:cs typeface="Times New Roman" pitchFamily="18" charset="0"/>
+              </a:rPr>
+              <a:t> dung HTML </a:t>
+            </a:r>
+            <a:r>
+              <a:rPr lang="en-US" sz="2000" dirty="0" err="1" smtClean="0">
+                <a:latin typeface="Times New Roman" pitchFamily="18" charset="0"/>
+                <a:cs typeface="Times New Roman" pitchFamily="18" charset="0"/>
+              </a:rPr>
+              <a:t>để</a:t>
+            </a:r>
+            <a:r>
+              <a:rPr lang="en-US" sz="2000" dirty="0" smtClean="0">
+                <a:latin typeface="Times New Roman" pitchFamily="18" charset="0"/>
+                <a:cs typeface="Times New Roman" pitchFamily="18" charset="0"/>
+              </a:rPr>
+              <a:t> </a:t>
+            </a:r>
+            <a:r>
+              <a:rPr lang="en-US" sz="2000" dirty="0" err="1" smtClean="0">
+                <a:latin typeface="Times New Roman" pitchFamily="18" charset="0"/>
+                <a:cs typeface="Times New Roman" pitchFamily="18" charset="0"/>
+              </a:rPr>
+              <a:t>lấy</a:t>
+            </a:r>
+            <a:r>
+              <a:rPr lang="en-US" sz="2000" dirty="0" smtClean="0">
+                <a:latin typeface="Times New Roman" pitchFamily="18" charset="0"/>
+                <a:cs typeface="Times New Roman" pitchFamily="18" charset="0"/>
+              </a:rPr>
+              <a:t> </a:t>
+            </a:r>
+            <a:r>
+              <a:rPr lang="en-US" sz="2000" dirty="0" err="1" smtClean="0">
+                <a:latin typeface="Times New Roman" pitchFamily="18" charset="0"/>
+                <a:cs typeface="Times New Roman" pitchFamily="18" charset="0"/>
+              </a:rPr>
+              <a:t>thông</a:t>
+            </a:r>
+            <a:r>
+              <a:rPr lang="en-US" sz="2000" dirty="0" smtClean="0">
+                <a:latin typeface="Times New Roman" pitchFamily="18" charset="0"/>
+                <a:cs typeface="Times New Roman" pitchFamily="18" charset="0"/>
+              </a:rPr>
+              <a:t> tin </a:t>
+            </a:r>
+            <a:r>
+              <a:rPr lang="en-US" sz="2000" dirty="0" err="1" smtClean="0">
+                <a:latin typeface="Times New Roman" pitchFamily="18" charset="0"/>
+                <a:cs typeface="Times New Roman" pitchFamily="18" charset="0"/>
+              </a:rPr>
+              <a:t>bài</a:t>
+            </a:r>
+            <a:r>
+              <a:rPr lang="en-US" sz="2000" dirty="0" smtClean="0">
+                <a:latin typeface="Times New Roman" pitchFamily="18" charset="0"/>
+                <a:cs typeface="Times New Roman" pitchFamily="18" charset="0"/>
+              </a:rPr>
+              <a:t> </a:t>
+            </a:r>
+            <a:r>
+              <a:rPr lang="en-US" sz="2000" dirty="0" err="1" smtClean="0">
+                <a:latin typeface="Times New Roman" pitchFamily="18" charset="0"/>
+                <a:cs typeface="Times New Roman" pitchFamily="18" charset="0"/>
+              </a:rPr>
+              <a:t>báo</a:t>
+            </a:r>
+            <a:r>
+              <a:rPr lang="en-US" sz="2000" dirty="0" smtClean="0">
+                <a:latin typeface="Times New Roman" pitchFamily="18" charset="0"/>
+                <a:cs typeface="Times New Roman" pitchFamily="18" charset="0"/>
+              </a:rPr>
+              <a:t> </a:t>
+            </a:r>
+            <a:r>
+              <a:rPr lang="en-US" sz="2000" dirty="0" err="1" smtClean="0">
+                <a:latin typeface="Times New Roman" pitchFamily="18" charset="0"/>
+                <a:cs typeface="Times New Roman" pitchFamily="18" charset="0"/>
+              </a:rPr>
+              <a:t>bổ</a:t>
+            </a:r>
+            <a:r>
+              <a:rPr lang="en-US" sz="2000" dirty="0" smtClean="0">
+                <a:latin typeface="Times New Roman" pitchFamily="18" charset="0"/>
+                <a:cs typeface="Times New Roman" pitchFamily="18" charset="0"/>
+              </a:rPr>
+              <a:t> </a:t>
+            </a:r>
+            <a:r>
+              <a:rPr lang="en-US" sz="2000" dirty="0" err="1" smtClean="0">
+                <a:latin typeface="Times New Roman" pitchFamily="18" charset="0"/>
+                <a:cs typeface="Times New Roman" pitchFamily="18" charset="0"/>
+              </a:rPr>
+              <a:t>xung</a:t>
+            </a:r>
+            <a:r>
+              <a:rPr lang="en-US" sz="2000" dirty="0" smtClean="0">
+                <a:latin typeface="Times New Roman" pitchFamily="18" charset="0"/>
+                <a:cs typeface="Times New Roman" pitchFamily="18" charset="0"/>
+              </a:rPr>
+              <a:t> </a:t>
+            </a:r>
+            <a:r>
+              <a:rPr lang="en-US" sz="2000" dirty="0" err="1" smtClean="0">
+                <a:latin typeface="Times New Roman" pitchFamily="18" charset="0"/>
+                <a:cs typeface="Times New Roman" pitchFamily="18" charset="0"/>
+              </a:rPr>
+              <a:t>vào</a:t>
+            </a:r>
+            <a:r>
+              <a:rPr lang="en-US" sz="2000" dirty="0" smtClean="0">
+                <a:latin typeface="Times New Roman" pitchFamily="18" charset="0"/>
+                <a:cs typeface="Times New Roman" pitchFamily="18" charset="0"/>
+              </a:rPr>
+              <a:t> </a:t>
+            </a:r>
+            <a:r>
+              <a:rPr lang="en-US" sz="2000" dirty="0" err="1" smtClean="0">
+                <a:latin typeface="Times New Roman" pitchFamily="18" charset="0"/>
+                <a:cs typeface="Times New Roman" pitchFamily="18" charset="0"/>
+              </a:rPr>
+              <a:t>dbsa</a:t>
+            </a:r>
+            <a:r>
+              <a:rPr lang="en-US" sz="2000" dirty="0" smtClean="0">
+                <a:latin typeface="Times New Roman" pitchFamily="18" charset="0"/>
+                <a:cs typeface="Times New Roman" pitchFamily="18" charset="0"/>
+              </a:rPr>
+              <a:t>. </a:t>
+            </a:r>
+          </a:p>
+        </p:txBody>
+      </p:sp>
+      <p:sp>
+        <p:nvSpPr>
+          <p:cNvPr id="4" name="Smiley Face 3"/>
+          <p:cNvSpPr/>
+          <p:nvPr/>
+        </p:nvSpPr>
+        <p:spPr>
+          <a:xfrm>
+            <a:off x="8153400" y="5715000"/>
+            <a:ext cx="609600" cy="609600"/>
+          </a:xfrm>
+          <a:prstGeom prst="smileyFace">
+            <a:avLst>
+              <a:gd name="adj" fmla="val -2490"/>
+            </a:avLst>
+          </a:prstGeom>
+        </p:spPr>
+        <p:style>
+          <a:lnRef idx="2">
+            <a:schemeClr val="accent1">
+              <a:shade val="50000"/>
+            </a:schemeClr>
+          </a:lnRef>
+          <a:fillRef idx="1">
+            <a:schemeClr val="accent1"/>
+          </a:fillRef>
+          <a:effectRef idx="0">
+            <a:schemeClr val="accent1"/>
+          </a:effectRef>
+          <a:fontRef idx="minor">
+            <a:schemeClr val="lt1"/>
+          </a:fontRef>
+        </p:style>
+        <p:txBody>
+          <a:bodyPr rtlCol="0" anchor="ctr"/>
+          <a:lstStyle/>
+          <a:p>
+            <a:pPr algn="ctr"/>
+            <a:endParaRPr lang="en-US"/>
           </a:p>
         </p:txBody>
       </p:sp>
@@ -17344,706 +18786,6 @@
 </file>
 
 <file path=ppt/slides/slide22.xml><?xml version="1.0" encoding="utf-8"?>
-<p:sld xmlns:a="http://schemas.openxmlformats.org/drawingml/2006/main" xmlns:r="http://schemas.openxmlformats.org/officeDocument/2006/relationships" xmlns:p="http://schemas.openxmlformats.org/presentationml/2006/main">
-  <p:cSld>
-    <p:spTree>
-      <p:nvGrpSpPr>
-        <p:cNvPr id="1" name=""/>
-        <p:cNvGrpSpPr/>
-        <p:nvPr/>
-      </p:nvGrpSpPr>
-      <p:grpSpPr>
-        <a:xfrm>
-          <a:off x="0" y="0"/>
-          <a:ext cx="0" cy="0"/>
-          <a:chOff x="0" y="0"/>
-          <a:chExt cx="0" cy="0"/>
-        </a:xfrm>
-      </p:grpSpPr>
-      <p:sp>
-        <p:nvSpPr>
-          <p:cNvPr id="2" name="Title 1"/>
-          <p:cNvSpPr>
-            <a:spLocks noGrp="1"/>
-          </p:cNvSpPr>
-          <p:nvPr>
-            <p:ph type="title"/>
-          </p:nvPr>
-        </p:nvSpPr>
-        <p:spPr/>
-        <p:txBody>
-          <a:bodyPr>
-            <a:normAutofit/>
-          </a:bodyPr>
-          <a:lstStyle/>
-          <a:p>
-            <a:pPr lvl="0"/>
-            <a:r>
-              <a:rPr lang="en-US" dirty="0" err="1" smtClean="0">
-                <a:latin typeface="Times New Roman" pitchFamily="18" charset="0"/>
-                <a:cs typeface="Times New Roman" pitchFamily="18" charset="0"/>
-              </a:rPr>
-              <a:t>Các</a:t>
-            </a:r>
-            <a:r>
-              <a:rPr lang="en-US" dirty="0" smtClean="0">
-                <a:latin typeface="Times New Roman" pitchFamily="18" charset="0"/>
-                <a:cs typeface="Times New Roman" pitchFamily="18" charset="0"/>
-              </a:rPr>
-              <a:t> </a:t>
-            </a:r>
-            <a:r>
-              <a:rPr lang="en-US" dirty="0" err="1" smtClean="0">
-                <a:latin typeface="Times New Roman" pitchFamily="18" charset="0"/>
-                <a:cs typeface="Times New Roman" pitchFamily="18" charset="0"/>
-              </a:rPr>
-              <a:t>tài</a:t>
-            </a:r>
-            <a:r>
-              <a:rPr lang="en-US" dirty="0" smtClean="0">
-                <a:latin typeface="Times New Roman" pitchFamily="18" charset="0"/>
-                <a:cs typeface="Times New Roman" pitchFamily="18" charset="0"/>
-              </a:rPr>
-              <a:t> </a:t>
-            </a:r>
-            <a:r>
-              <a:rPr lang="en-US" dirty="0" err="1" smtClean="0">
-                <a:latin typeface="Times New Roman" pitchFamily="18" charset="0"/>
-                <a:cs typeface="Times New Roman" pitchFamily="18" charset="0"/>
-              </a:rPr>
-              <a:t>liệu</a:t>
-            </a:r>
-            <a:r>
-              <a:rPr lang="en-US" dirty="0" smtClean="0">
-                <a:latin typeface="Times New Roman" pitchFamily="18" charset="0"/>
-                <a:cs typeface="Times New Roman" pitchFamily="18" charset="0"/>
-              </a:rPr>
-              <a:t> </a:t>
-            </a:r>
-            <a:r>
-              <a:rPr lang="en-US" dirty="0" err="1" smtClean="0">
-                <a:latin typeface="Times New Roman" pitchFamily="18" charset="0"/>
-                <a:cs typeface="Times New Roman" pitchFamily="18" charset="0"/>
-              </a:rPr>
-              <a:t>tham</a:t>
-            </a:r>
-            <a:r>
-              <a:rPr lang="en-US" dirty="0" smtClean="0">
-                <a:latin typeface="Times New Roman" pitchFamily="18" charset="0"/>
-                <a:cs typeface="Times New Roman" pitchFamily="18" charset="0"/>
-              </a:rPr>
-              <a:t> </a:t>
-            </a:r>
-            <a:r>
-              <a:rPr lang="en-US" dirty="0" err="1" smtClean="0">
-                <a:latin typeface="Times New Roman" pitchFamily="18" charset="0"/>
-                <a:cs typeface="Times New Roman" pitchFamily="18" charset="0"/>
-              </a:rPr>
-              <a:t>khảo</a:t>
-            </a:r>
-            <a:r>
-              <a:rPr lang="en-US" dirty="0" smtClean="0">
-                <a:latin typeface="Times New Roman" pitchFamily="18" charset="0"/>
-                <a:cs typeface="Times New Roman" pitchFamily="18" charset="0"/>
-              </a:rPr>
-              <a:t> </a:t>
-            </a:r>
-            <a:r>
-              <a:rPr lang="en-US" dirty="0" err="1" smtClean="0">
-                <a:latin typeface="Times New Roman" pitchFamily="18" charset="0"/>
-                <a:cs typeface="Times New Roman" pitchFamily="18" charset="0"/>
-              </a:rPr>
-              <a:t>chính</a:t>
-            </a:r>
-            <a:r>
-              <a:rPr lang="en-US" dirty="0" smtClean="0">
-                <a:latin typeface="Times New Roman" pitchFamily="18" charset="0"/>
-                <a:cs typeface="Times New Roman" pitchFamily="18" charset="0"/>
-              </a:rPr>
-              <a:t> </a:t>
-            </a:r>
-            <a:r>
-              <a:rPr lang="en-US" dirty="0" err="1" smtClean="0">
-                <a:latin typeface="Times New Roman" pitchFamily="18" charset="0"/>
-                <a:cs typeface="Times New Roman" pitchFamily="18" charset="0"/>
-              </a:rPr>
-              <a:t>dự</a:t>
-            </a:r>
-            <a:r>
-              <a:rPr lang="en-US" dirty="0" smtClean="0">
-                <a:latin typeface="Times New Roman" pitchFamily="18" charset="0"/>
-                <a:cs typeface="Times New Roman" pitchFamily="18" charset="0"/>
-              </a:rPr>
-              <a:t> </a:t>
-            </a:r>
-            <a:r>
-              <a:rPr lang="en-US" dirty="0" err="1" smtClean="0">
-                <a:latin typeface="Times New Roman" pitchFamily="18" charset="0"/>
-                <a:cs typeface="Times New Roman" pitchFamily="18" charset="0"/>
-              </a:rPr>
-              <a:t>kiến</a:t>
-            </a:r>
-            <a:r>
-              <a:rPr lang="en-US" dirty="0" smtClean="0">
-                <a:latin typeface="Times New Roman" pitchFamily="18" charset="0"/>
-                <a:cs typeface="Times New Roman" pitchFamily="18" charset="0"/>
-              </a:rPr>
-              <a:t>.</a:t>
-            </a:r>
-            <a:r>
-              <a:rPr lang="en-US" sz="2800" dirty="0" smtClean="0">
-                <a:latin typeface="Times New Roman" pitchFamily="18" charset="0"/>
-                <a:cs typeface="Times New Roman" pitchFamily="18" charset="0"/>
-              </a:rPr>
-              <a:t/>
-            </a:r>
-            <a:br>
-              <a:rPr lang="en-US" sz="2800" dirty="0" smtClean="0">
-                <a:latin typeface="Times New Roman" pitchFamily="18" charset="0"/>
-                <a:cs typeface="Times New Roman" pitchFamily="18" charset="0"/>
-              </a:rPr>
-            </a:br>
-            <a:endParaRPr lang="en-US" dirty="0"/>
-          </a:p>
-        </p:txBody>
-      </p:sp>
-      <p:sp>
-        <p:nvSpPr>
-          <p:cNvPr id="3" name="Content Placeholder 2"/>
-          <p:cNvSpPr>
-            <a:spLocks noGrp="1"/>
-          </p:cNvSpPr>
-          <p:nvPr>
-            <p:ph idx="1"/>
-          </p:nvPr>
-        </p:nvSpPr>
-        <p:spPr>
-          <a:xfrm>
-            <a:off x="228600" y="1295400"/>
-            <a:ext cx="8763000" cy="4784725"/>
-          </a:xfrm>
-        </p:spPr>
-        <p:txBody>
-          <a:bodyPr>
-            <a:normAutofit lnSpcReduction="10000"/>
-          </a:bodyPr>
-          <a:lstStyle/>
-          <a:p>
-            <a:pPr>
-              <a:buNone/>
-            </a:pPr>
-            <a:r>
-              <a:rPr lang="en-US" sz="2000" dirty="0" smtClean="0">
-                <a:latin typeface="Times New Roman" pitchFamily="18" charset="0"/>
-                <a:cs typeface="Times New Roman" pitchFamily="18" charset="0"/>
-              </a:rPr>
-              <a:t>[1]</a:t>
-            </a:r>
-            <a:r>
-              <a:rPr lang="en-US" sz="2000" dirty="0" err="1" smtClean="0">
-                <a:latin typeface="Times New Roman" pitchFamily="18" charset="0"/>
-                <a:cs typeface="Times New Roman" pitchFamily="18" charset="0"/>
-              </a:rPr>
-              <a:t>Ashwin</a:t>
-            </a:r>
-            <a:r>
-              <a:rPr lang="en-US" sz="2000" dirty="0" smtClean="0">
-                <a:latin typeface="Times New Roman" pitchFamily="18" charset="0"/>
-                <a:cs typeface="Times New Roman" pitchFamily="18" charset="0"/>
-              </a:rPr>
-              <a:t> </a:t>
-            </a:r>
-            <a:r>
-              <a:rPr lang="en-US" sz="2000" dirty="0" err="1" smtClean="0">
-                <a:latin typeface="Times New Roman" pitchFamily="18" charset="0"/>
-                <a:cs typeface="Times New Roman" pitchFamily="18" charset="0"/>
-              </a:rPr>
-              <a:t>Pulijala</a:t>
-            </a:r>
-            <a:r>
-              <a:rPr lang="en-US" sz="2000" dirty="0" smtClean="0">
-                <a:latin typeface="Times New Roman" pitchFamily="18" charset="0"/>
-                <a:cs typeface="Times New Roman" pitchFamily="18" charset="0"/>
-              </a:rPr>
-              <a:t>. Susan </a:t>
-            </a:r>
-            <a:r>
-              <a:rPr lang="en-US" sz="2000" dirty="0" err="1" smtClean="0">
-                <a:latin typeface="Times New Roman" pitchFamily="18" charset="0"/>
-                <a:cs typeface="Times New Roman" pitchFamily="18" charset="0"/>
-              </a:rPr>
-              <a:t>Gauch</a:t>
-            </a:r>
-            <a:r>
-              <a:rPr lang="en-US" sz="2000" dirty="0" smtClean="0">
-                <a:latin typeface="Times New Roman" pitchFamily="18" charset="0"/>
-                <a:cs typeface="Times New Roman" pitchFamily="18" charset="0"/>
-              </a:rPr>
-              <a:t>. </a:t>
-            </a:r>
-            <a:r>
-              <a:rPr lang="en-US" sz="2000" i="1" dirty="0" smtClean="0">
-                <a:latin typeface="Times New Roman" pitchFamily="18" charset="0"/>
-                <a:cs typeface="Times New Roman" pitchFamily="18" charset="0"/>
-              </a:rPr>
-              <a:t>Hierarchical Text Classification</a:t>
-            </a:r>
-            <a:r>
-              <a:rPr lang="en-US" sz="2000" dirty="0" smtClean="0">
-                <a:latin typeface="Times New Roman" pitchFamily="18" charset="0"/>
-                <a:cs typeface="Times New Roman" pitchFamily="18" charset="0"/>
-              </a:rPr>
-              <a:t>. Department of Electrical Engineering and Computer </a:t>
-            </a:r>
-            <a:r>
-              <a:rPr lang="en-US" sz="2000" dirty="0" err="1" smtClean="0">
-                <a:latin typeface="Times New Roman" pitchFamily="18" charset="0"/>
-                <a:cs typeface="Times New Roman" pitchFamily="18" charset="0"/>
-              </a:rPr>
-              <a:t>ScienceUniversity</a:t>
-            </a:r>
-            <a:r>
-              <a:rPr lang="en-US" sz="2000" dirty="0" smtClean="0">
-                <a:latin typeface="Times New Roman" pitchFamily="18" charset="0"/>
-                <a:cs typeface="Times New Roman" pitchFamily="18" charset="0"/>
-              </a:rPr>
-              <a:t> of Kansas .</a:t>
-            </a:r>
-          </a:p>
-          <a:p>
-            <a:pPr>
-              <a:buNone/>
-            </a:pPr>
-            <a:r>
-              <a:rPr lang="en-US" sz="2000" dirty="0" smtClean="0">
-                <a:latin typeface="Times New Roman" pitchFamily="18" charset="0"/>
-                <a:cs typeface="Times New Roman" pitchFamily="18" charset="0"/>
-              </a:rPr>
-              <a:t>[2] </a:t>
-            </a:r>
-            <a:r>
-              <a:rPr lang="en-US" sz="2000" dirty="0" err="1" smtClean="0">
-                <a:latin typeface="Times New Roman" pitchFamily="18" charset="0"/>
-                <a:cs typeface="Times New Roman" pitchFamily="18" charset="0"/>
-              </a:rPr>
-              <a:t>Aixin</a:t>
-            </a:r>
-            <a:r>
-              <a:rPr lang="en-US" sz="2000" dirty="0" smtClean="0">
-                <a:latin typeface="Times New Roman" pitchFamily="18" charset="0"/>
-                <a:cs typeface="Times New Roman" pitchFamily="18" charset="0"/>
-              </a:rPr>
-              <a:t> Sun and </a:t>
-            </a:r>
-            <a:r>
-              <a:rPr lang="en-US" sz="2000" dirty="0" err="1" smtClean="0">
-                <a:latin typeface="Times New Roman" pitchFamily="18" charset="0"/>
-                <a:cs typeface="Times New Roman" pitchFamily="18" charset="0"/>
-              </a:rPr>
-              <a:t>Ee-Peng</a:t>
-            </a:r>
-            <a:r>
-              <a:rPr lang="en-US" sz="2000" dirty="0" smtClean="0">
-                <a:latin typeface="Times New Roman" pitchFamily="18" charset="0"/>
-                <a:cs typeface="Times New Roman" pitchFamily="18" charset="0"/>
-              </a:rPr>
-              <a:t> Lim. </a:t>
-            </a:r>
-            <a:r>
-              <a:rPr lang="en-US" sz="2000" i="1" dirty="0" smtClean="0">
-                <a:latin typeface="Times New Roman" pitchFamily="18" charset="0"/>
-                <a:cs typeface="Times New Roman" pitchFamily="18" charset="0"/>
-              </a:rPr>
-              <a:t>Hierarchical Text Classification and Evaluation</a:t>
-            </a:r>
-            <a:r>
-              <a:rPr lang="en-US" sz="2000" dirty="0" smtClean="0">
-                <a:latin typeface="Times New Roman" pitchFamily="18" charset="0"/>
-                <a:cs typeface="Times New Roman" pitchFamily="18" charset="0"/>
-              </a:rPr>
-              <a:t>. Center for Advanced Information </a:t>
-            </a:r>
-            <a:r>
-              <a:rPr lang="en-US" sz="2000" dirty="0" err="1" smtClean="0">
-                <a:latin typeface="Times New Roman" pitchFamily="18" charset="0"/>
-                <a:cs typeface="Times New Roman" pitchFamily="18" charset="0"/>
-              </a:rPr>
-              <a:t>SystemsNanyang</a:t>
-            </a:r>
-            <a:r>
-              <a:rPr lang="en-US" sz="2000" dirty="0" smtClean="0">
-                <a:latin typeface="Times New Roman" pitchFamily="18" charset="0"/>
-                <a:cs typeface="Times New Roman" pitchFamily="18" charset="0"/>
-              </a:rPr>
-              <a:t> Technological University</a:t>
-            </a:r>
-          </a:p>
-          <a:p>
-            <a:pPr>
-              <a:buNone/>
-            </a:pPr>
-            <a:r>
-              <a:rPr lang="en-US" sz="2000" dirty="0" smtClean="0">
-                <a:latin typeface="Times New Roman" pitchFamily="18" charset="0"/>
-                <a:cs typeface="Times New Roman" pitchFamily="18" charset="0"/>
-              </a:rPr>
-              <a:t>[3] </a:t>
-            </a:r>
-            <a:r>
-              <a:rPr lang="en-US" sz="2000" dirty="0" err="1" smtClean="0">
-                <a:latin typeface="Times New Roman" pitchFamily="18" charset="0"/>
-                <a:cs typeface="Times New Roman" pitchFamily="18" charset="0"/>
-              </a:rPr>
-              <a:t>Koller</a:t>
-            </a:r>
-            <a:r>
-              <a:rPr lang="en-US" sz="2000" dirty="0" smtClean="0">
-                <a:latin typeface="Times New Roman" pitchFamily="18" charset="0"/>
-                <a:cs typeface="Times New Roman" pitchFamily="18" charset="0"/>
-              </a:rPr>
-              <a:t>  D.  and  </a:t>
-            </a:r>
-            <a:r>
-              <a:rPr lang="en-US" sz="2000" dirty="0" err="1" smtClean="0">
-                <a:latin typeface="Times New Roman" pitchFamily="18" charset="0"/>
-                <a:cs typeface="Times New Roman" pitchFamily="18" charset="0"/>
-              </a:rPr>
-              <a:t>Sahami</a:t>
-            </a:r>
-            <a:r>
-              <a:rPr lang="en-US" sz="2000" dirty="0" smtClean="0">
-                <a:latin typeface="Times New Roman" pitchFamily="18" charset="0"/>
-                <a:cs typeface="Times New Roman" pitchFamily="18" charset="0"/>
-              </a:rPr>
-              <a:t>  M.  (1997).  </a:t>
-            </a:r>
-            <a:r>
-              <a:rPr lang="en-US" sz="2000" i="1" dirty="0" smtClean="0">
-                <a:latin typeface="Times New Roman" pitchFamily="18" charset="0"/>
-                <a:cs typeface="Times New Roman" pitchFamily="18" charset="0"/>
-              </a:rPr>
-              <a:t>Hierarchically  Classifying  Documents  using  Very  Few  Words</a:t>
-            </a:r>
-            <a:r>
-              <a:rPr lang="en-US" sz="2000" dirty="0" smtClean="0">
-                <a:latin typeface="Times New Roman" pitchFamily="18" charset="0"/>
-                <a:cs typeface="Times New Roman" pitchFamily="18" charset="0"/>
-              </a:rPr>
-              <a:t>. International Conference on Machine Learning,  pp.170-178, Volume 14, Morgan-Kauffman.</a:t>
-            </a:r>
-          </a:p>
-          <a:p>
-            <a:pPr>
-              <a:buNone/>
-            </a:pPr>
-            <a:r>
-              <a:rPr lang="en-US" sz="2000" dirty="0" smtClean="0">
-                <a:latin typeface="Times New Roman" pitchFamily="18" charset="0"/>
-                <a:cs typeface="Times New Roman" pitchFamily="18" charset="0"/>
-              </a:rPr>
-              <a:t>[4] T</a:t>
-            </a:r>
-            <a:r>
-              <a:rPr lang="en-US" sz="2000" dirty="0" smtClean="0"/>
-              <a:t>horsten </a:t>
-            </a:r>
-            <a:r>
-              <a:rPr lang="en-US" sz="2000" dirty="0" err="1" smtClean="0"/>
-              <a:t>Joachims</a:t>
-            </a:r>
-            <a:r>
-              <a:rPr lang="en-US" sz="2000" dirty="0" smtClean="0"/>
-              <a:t>.  </a:t>
-            </a:r>
-            <a:r>
-              <a:rPr lang="en-US" sz="2000" i="1" dirty="0" smtClean="0">
-                <a:latin typeface="Times New Roman" pitchFamily="18" charset="0"/>
-                <a:cs typeface="Times New Roman" pitchFamily="18" charset="0"/>
-              </a:rPr>
-              <a:t>Text categorization with SVM </a:t>
-            </a:r>
-            <a:r>
-              <a:rPr lang="en-US" sz="2000" i="1" dirty="0" err="1" smtClean="0">
-                <a:latin typeface="Times New Roman" pitchFamily="18" charset="0"/>
-                <a:cs typeface="Times New Roman" pitchFamily="18" charset="0"/>
-              </a:rPr>
-              <a:t>lear</a:t>
-            </a:r>
-            <a:r>
-              <a:rPr lang="en-US" sz="2000" i="1" dirty="0" smtClean="0">
-                <a:latin typeface="Times New Roman" pitchFamily="18" charset="0"/>
-                <a:cs typeface="Times New Roman" pitchFamily="18" charset="0"/>
-              </a:rPr>
-              <a:t> with many relevant</a:t>
-            </a:r>
-          </a:p>
-          <a:p>
-            <a:pPr>
-              <a:buNone/>
-            </a:pPr>
-            <a:r>
-              <a:rPr lang="en-US" sz="2000" dirty="0" smtClean="0">
-                <a:latin typeface="Times New Roman" pitchFamily="18" charset="0"/>
-                <a:cs typeface="Times New Roman" pitchFamily="18" charset="0"/>
-              </a:rPr>
-              <a:t>[5] </a:t>
-            </a:r>
-            <a:r>
-              <a:rPr lang="en-US" sz="2000" dirty="0" err="1" smtClean="0">
-                <a:latin typeface="Times New Roman" pitchFamily="18" charset="0"/>
-                <a:cs typeface="Times New Roman" pitchFamily="18" charset="0"/>
-              </a:rPr>
-              <a:t>Mladenic</a:t>
-            </a:r>
-            <a:r>
-              <a:rPr lang="en-US" sz="2000" dirty="0" smtClean="0">
-                <a:latin typeface="Times New Roman" pitchFamily="18" charset="0"/>
-                <a:cs typeface="Times New Roman" pitchFamily="18" charset="0"/>
-              </a:rPr>
-              <a:t>  D.  </a:t>
-            </a:r>
-            <a:r>
-              <a:rPr lang="en-US" sz="2000" dirty="0" err="1" smtClean="0">
-                <a:latin typeface="Times New Roman" pitchFamily="18" charset="0"/>
-                <a:cs typeface="Times New Roman" pitchFamily="18" charset="0"/>
-              </a:rPr>
-              <a:t>Grobelnik</a:t>
-            </a:r>
-            <a:r>
-              <a:rPr lang="en-US" sz="2000" dirty="0" smtClean="0">
-                <a:latin typeface="Times New Roman" pitchFamily="18" charset="0"/>
-                <a:cs typeface="Times New Roman" pitchFamily="18" charset="0"/>
-              </a:rPr>
-              <a:t>  M.  </a:t>
-            </a:r>
-            <a:r>
-              <a:rPr lang="en-US" sz="2000" dirty="0" err="1" smtClean="0">
-                <a:latin typeface="Times New Roman" pitchFamily="18" charset="0"/>
-                <a:cs typeface="Times New Roman" pitchFamily="18" charset="0"/>
-              </a:rPr>
-              <a:t>(1998).  </a:t>
-            </a:r>
-            <a:r>
-              <a:rPr lang="en-US" sz="2000" dirty="0" smtClean="0">
-                <a:latin typeface="Times New Roman" pitchFamily="18" charset="0"/>
-                <a:cs typeface="Times New Roman" pitchFamily="18" charset="0"/>
-              </a:rPr>
-              <a:t>Feature  Selection  for  Classification  Based on  Text  </a:t>
-            </a:r>
-            <a:r>
-              <a:rPr lang="en-US" sz="2000" dirty="0" err="1" smtClean="0">
-                <a:latin typeface="Times New Roman" pitchFamily="18" charset="0"/>
-                <a:cs typeface="Times New Roman" pitchFamily="18" charset="0"/>
-              </a:rPr>
-              <a:t>Hierarchy.Working</a:t>
-            </a:r>
-            <a:r>
-              <a:rPr lang="en-US" sz="2000" dirty="0" smtClean="0">
-                <a:latin typeface="Times New Roman" pitchFamily="18" charset="0"/>
-                <a:cs typeface="Times New Roman" pitchFamily="18" charset="0"/>
-              </a:rPr>
-              <a:t> notes of Learning from Text and the Web, Conference on Automated Learning and Discovery CONALD-98.</a:t>
-            </a:r>
-          </a:p>
-          <a:p>
-            <a:pPr lvl="0">
-              <a:buNone/>
-            </a:pPr>
-            <a:r>
-              <a:rPr lang="en-US" sz="2000" dirty="0" smtClean="0">
-                <a:latin typeface="Times New Roman" pitchFamily="18" charset="0"/>
-                <a:cs typeface="Times New Roman" pitchFamily="18" charset="0"/>
-              </a:rPr>
-              <a:t>[6]</a:t>
-            </a:r>
-            <a:r>
-              <a:rPr lang="en-US" sz="2000" dirty="0" smtClean="0"/>
-              <a:t> </a:t>
-            </a:r>
-            <a:r>
-              <a:rPr lang="en-US" sz="2000" dirty="0" smtClean="0">
-                <a:latin typeface="Times New Roman" pitchFamily="18" charset="0"/>
-                <a:cs typeface="Times New Roman" pitchFamily="18" charset="0"/>
-              </a:rPr>
-              <a:t>Tao Wang. </a:t>
-            </a:r>
-            <a:r>
-              <a:rPr lang="en-US" sz="2000" i="1" dirty="0" smtClean="0">
-                <a:latin typeface="Times New Roman" pitchFamily="18" charset="0"/>
-                <a:cs typeface="Times New Roman" pitchFamily="18" charset="0"/>
-              </a:rPr>
-              <a:t>Document Classification with ACM Subject Hierarchy. </a:t>
-            </a:r>
-            <a:r>
-              <a:rPr lang="en-US" sz="2000" dirty="0" smtClean="0">
-                <a:latin typeface="Times New Roman" pitchFamily="18" charset="0"/>
-                <a:cs typeface="Times New Roman" pitchFamily="18" charset="0"/>
-              </a:rPr>
-              <a:t>Electrical and Computer Engineering, 2007. </a:t>
-            </a:r>
-            <a:r>
-              <a:rPr lang="en-US" sz="2000" dirty="0" err="1" smtClean="0">
-                <a:latin typeface="Times New Roman" pitchFamily="18" charset="0"/>
-                <a:cs typeface="Times New Roman" pitchFamily="18" charset="0"/>
-              </a:rPr>
-              <a:t>CCECE 2007. </a:t>
-            </a:r>
-            <a:r>
-              <a:rPr lang="en-US" sz="2000" dirty="0" smtClean="0">
-                <a:latin typeface="Times New Roman" pitchFamily="18" charset="0"/>
-                <a:cs typeface="Times New Roman" pitchFamily="18" charset="0"/>
-              </a:rPr>
-              <a:t>Canadian Conference on </a:t>
-            </a:r>
-          </a:p>
-          <a:p>
-            <a:pPr lvl="0">
-              <a:buNone/>
-            </a:pPr>
-            <a:r>
-              <a:rPr lang="en-US" sz="2000" dirty="0" smtClean="0">
-                <a:latin typeface="Times New Roman" pitchFamily="18" charset="0"/>
-                <a:cs typeface="Times New Roman" pitchFamily="18" charset="0"/>
-              </a:rPr>
-              <a:t>[7] </a:t>
-            </a:r>
-            <a:r>
-              <a:rPr lang="en-US" sz="2000" dirty="0" err="1" smtClean="0">
-                <a:latin typeface="Times New Roman" pitchFamily="18" charset="0"/>
-                <a:cs typeface="Times New Roman" pitchFamily="18" charset="0"/>
-              </a:rPr>
-              <a:t>Gui-Rong</a:t>
-            </a:r>
-            <a:r>
-              <a:rPr lang="en-US" sz="2000" dirty="0" smtClean="0">
-                <a:latin typeface="Times New Roman" pitchFamily="18" charset="0"/>
-                <a:cs typeface="Times New Roman" pitchFamily="18" charset="0"/>
-              </a:rPr>
-              <a:t> </a:t>
-            </a:r>
-            <a:r>
-              <a:rPr lang="en-US" sz="2000" dirty="0" err="1" smtClean="0">
-                <a:latin typeface="Times New Roman" pitchFamily="18" charset="0"/>
-                <a:cs typeface="Times New Roman" pitchFamily="18" charset="0"/>
-              </a:rPr>
-              <a:t>Xue</a:t>
-            </a:r>
-            <a:r>
-              <a:rPr lang="en-US" sz="2000" dirty="0" smtClean="0">
-                <a:latin typeface="Times New Roman" pitchFamily="18" charset="0"/>
-                <a:cs typeface="Times New Roman" pitchFamily="18" charset="0"/>
-              </a:rPr>
-              <a:t>. </a:t>
-            </a:r>
-            <a:r>
-              <a:rPr lang="en-US" sz="2000" dirty="0" err="1" smtClean="0">
-                <a:latin typeface="Times New Roman" pitchFamily="18" charset="0"/>
-                <a:cs typeface="Times New Roman" pitchFamily="18" charset="0"/>
-              </a:rPr>
-              <a:t>Dikan</a:t>
-            </a:r>
-            <a:r>
-              <a:rPr lang="en-US" sz="2000" dirty="0" smtClean="0">
-                <a:latin typeface="Times New Roman" pitchFamily="18" charset="0"/>
-                <a:cs typeface="Times New Roman" pitchFamily="18" charset="0"/>
-              </a:rPr>
-              <a:t> Xing. </a:t>
-            </a:r>
-            <a:r>
-              <a:rPr lang="en-US" sz="2000" dirty="0" err="1" smtClean="0">
-                <a:latin typeface="Times New Roman" pitchFamily="18" charset="0"/>
-                <a:cs typeface="Times New Roman" pitchFamily="18" charset="0"/>
-              </a:rPr>
-              <a:t>Qiang</a:t>
-            </a:r>
-            <a:r>
-              <a:rPr lang="en-US" sz="2000" dirty="0" smtClean="0">
-                <a:latin typeface="Times New Roman" pitchFamily="18" charset="0"/>
-                <a:cs typeface="Times New Roman" pitchFamily="18" charset="0"/>
-              </a:rPr>
-              <a:t> </a:t>
-            </a:r>
-            <a:r>
-              <a:rPr lang="en-US" sz="2000" dirty="0" err="1" smtClean="0">
-                <a:latin typeface="Times New Roman" pitchFamily="18" charset="0"/>
-                <a:cs typeface="Times New Roman" pitchFamily="18" charset="0"/>
-              </a:rPr>
-              <a:t>Yang.Yong</a:t>
-            </a:r>
-            <a:r>
-              <a:rPr lang="en-US" sz="2000" dirty="0" smtClean="0">
-                <a:latin typeface="Times New Roman" pitchFamily="18" charset="0"/>
-                <a:cs typeface="Times New Roman" pitchFamily="18" charset="0"/>
-              </a:rPr>
-              <a:t> Yu Deep. </a:t>
-            </a:r>
-            <a:r>
-              <a:rPr lang="en-US" sz="2000" i="1" dirty="0" smtClean="0">
-                <a:latin typeface="Times New Roman" pitchFamily="18" charset="0"/>
-                <a:cs typeface="Times New Roman" pitchFamily="18" charset="0"/>
-              </a:rPr>
-              <a:t>Classification in Large-scale Text Hierarchies </a:t>
-            </a:r>
-          </a:p>
-          <a:p>
-            <a:pPr>
-              <a:buNone/>
-            </a:pPr>
-            <a:endParaRPr lang="en-US" sz="2000" dirty="0" smtClean="0">
-              <a:latin typeface="Times New Roman" pitchFamily="18" charset="0"/>
-              <a:cs typeface="Times New Roman" pitchFamily="18" charset="0"/>
-            </a:endParaRPr>
-          </a:p>
-        </p:txBody>
-      </p:sp>
-      <p:sp>
-        <p:nvSpPr>
-          <p:cNvPr id="4" name="Slide Number Placeholder 3"/>
-          <p:cNvSpPr>
-            <a:spLocks noGrp="1"/>
-          </p:cNvSpPr>
-          <p:nvPr>
-            <p:ph type="sldNum" sz="quarter" idx="4294967295"/>
-          </p:nvPr>
-        </p:nvSpPr>
-        <p:spPr>
-          <a:xfrm>
-            <a:off x="8229600" y="6473952"/>
-            <a:ext cx="758952" cy="246888"/>
-          </a:xfrm>
-          <a:prstGeom prst="rect">
-            <a:avLst/>
-          </a:prstGeom>
-        </p:spPr>
-        <p:txBody>
-          <a:bodyPr/>
-          <a:lstStyle/>
-          <a:p>
-            <a:fld id="{B6F15528-21DE-4FAA-801E-634DDDAF4B2B}" type="slidenum">
-              <a:rPr lang="en-US" smtClean="0"/>
-              <a:pPr/>
-              <a:t>22</a:t>
-            </a:fld>
-            <a:endParaRPr lang="en-US"/>
-          </a:p>
-        </p:txBody>
-      </p:sp>
-    </p:spTree>
-  </p:cSld>
-  <p:clrMapOvr>
-    <a:masterClrMapping/>
-  </p:clrMapOvr>
-  <p:timing>
-    <p:tnLst>
-      <p:par>
-        <p:cTn id="1" dur="indefinite" restart="never" nodeType="tmRoot"/>
-      </p:par>
-    </p:tnLst>
-  </p:timing>
-</p:sld>
-</file>
-
-<file path=ppt/slides/slide23.xml><?xml version="1.0" encoding="utf-8"?>
 <p:sld xmlns:a="http://schemas.openxmlformats.org/drawingml/2006/main" xmlns:r="http://schemas.openxmlformats.org/officeDocument/2006/relationships" xmlns:p="http://schemas.openxmlformats.org/presentationml/2006/main">
   <p:cSld>
     <p:spTree>

</xml_diff>